<commit_message>
updating MLpart of presentation
</commit_message>
<xml_diff>
--- a/Presentation.pptx
+++ b/Presentation.pptx
@@ -5,7 +5,7 @@
     <p:sldMasterId id="2147483746" r:id="rId1"/>
   </p:sldMasterIdLst>
   <p:notesMasterIdLst>
-    <p:notesMasterId r:id="rId12"/>
+    <p:notesMasterId r:id="rId20"/>
   </p:notesMasterIdLst>
   <p:sldIdLst>
     <p:sldId id="257" r:id="rId2"/>
@@ -17,7 +17,15 @@
     <p:sldId id="268" r:id="rId8"/>
     <p:sldId id="269" r:id="rId9"/>
     <p:sldId id="264" r:id="rId10"/>
-    <p:sldId id="258" r:id="rId11"/>
+    <p:sldId id="270" r:id="rId11"/>
+    <p:sldId id="272" r:id="rId12"/>
+    <p:sldId id="273" r:id="rId13"/>
+    <p:sldId id="274" r:id="rId14"/>
+    <p:sldId id="275" r:id="rId15"/>
+    <p:sldId id="276" r:id="rId16"/>
+    <p:sldId id="277" r:id="rId17"/>
+    <p:sldId id="278" r:id="rId18"/>
+    <p:sldId id="258" r:id="rId19"/>
   </p:sldIdLst>
   <p:sldSz cx="12192000" cy="6858000"/>
   <p:notesSz cx="6858000" cy="9144000"/>
@@ -472,6 +480,846 @@
     </a:lvl9pPr>
   </p:notesStyle>
 </p:notesMaster>
+</file>
+
+<file path=ppt/notesSlides/notesSlide1.xml><?xml version="1.0" encoding="utf-8"?>
+<p:notes xmlns:a="http://schemas.openxmlformats.org/drawingml/2006/main" xmlns:r="http://schemas.openxmlformats.org/officeDocument/2006/relationships" xmlns:p="http://schemas.openxmlformats.org/presentationml/2006/main">
+  <p:cSld>
+    <p:spTree>
+      <p:nvGrpSpPr>
+        <p:cNvPr id="1" name=""/>
+        <p:cNvGrpSpPr/>
+        <p:nvPr/>
+      </p:nvGrpSpPr>
+      <p:grpSpPr>
+        <a:xfrm>
+          <a:off x="0" y="0"/>
+          <a:ext cx="0" cy="0"/>
+          <a:chOff x="0" y="0"/>
+          <a:chExt cx="0" cy="0"/>
+        </a:xfrm>
+      </p:grpSpPr>
+      <p:sp>
+        <p:nvSpPr>
+          <p:cNvPr id="2" name="Slide Image Placeholder 1"/>
+          <p:cNvSpPr>
+            <a:spLocks noGrp="1" noRot="1" noChangeAspect="1"/>
+          </p:cNvSpPr>
+          <p:nvPr>
+            <p:ph type="sldImg"/>
+          </p:nvPr>
+        </p:nvSpPr>
+        <p:spPr/>
+      </p:sp>
+      <p:sp>
+        <p:nvSpPr>
+          <p:cNvPr id="3" name="Notes Placeholder 2"/>
+          <p:cNvSpPr>
+            <a:spLocks noGrp="1"/>
+          </p:cNvSpPr>
+          <p:nvPr>
+            <p:ph type="body" idx="1"/>
+          </p:nvPr>
+        </p:nvSpPr>
+        <p:spPr/>
+        <p:txBody>
+          <a:bodyPr/>
+          <a:lstStyle/>
+          <a:p>
+            <a:r>
+              <a:rPr lang="en-AU" dirty="0"/>
+              <a:t>Looked at what we’ve been doing in class and figuring out which of the many varieties apply to our dataset and goal.</a:t>
+            </a:r>
+          </a:p>
+        </p:txBody>
+      </p:sp>
+      <p:sp>
+        <p:nvSpPr>
+          <p:cNvPr id="4" name="Slide Number Placeholder 3"/>
+          <p:cNvSpPr>
+            <a:spLocks noGrp="1"/>
+          </p:cNvSpPr>
+          <p:nvPr>
+            <p:ph type="sldNum" sz="quarter" idx="5"/>
+          </p:nvPr>
+        </p:nvSpPr>
+        <p:spPr/>
+        <p:txBody>
+          <a:bodyPr/>
+          <a:lstStyle/>
+          <a:p>
+            <a:fld id="{021BAEDA-B0F6-47F7-A56B-5E931A6B9DDE}" type="slidenum">
+              <a:rPr lang="en-AU" smtClean="0"/>
+              <a:t>10</a:t>
+            </a:fld>
+            <a:endParaRPr lang="en-AU"/>
+          </a:p>
+        </p:txBody>
+      </p:sp>
+    </p:spTree>
+    <p:extLst>
+      <p:ext uri="{BB962C8B-B14F-4D97-AF65-F5344CB8AC3E}">
+        <p14:creationId xmlns:p14="http://schemas.microsoft.com/office/powerpoint/2010/main" val="395747871"/>
+      </p:ext>
+    </p:extLst>
+  </p:cSld>
+  <p:clrMapOvr>
+    <a:masterClrMapping/>
+  </p:clrMapOvr>
+</p:notes>
+</file>
+
+<file path=ppt/notesSlides/notesSlide2.xml><?xml version="1.0" encoding="utf-8"?>
+<p:notes xmlns:a="http://schemas.openxmlformats.org/drawingml/2006/main" xmlns:r="http://schemas.openxmlformats.org/officeDocument/2006/relationships" xmlns:p="http://schemas.openxmlformats.org/presentationml/2006/main">
+  <p:cSld>
+    <p:spTree>
+      <p:nvGrpSpPr>
+        <p:cNvPr id="1" name=""/>
+        <p:cNvGrpSpPr/>
+        <p:nvPr/>
+      </p:nvGrpSpPr>
+      <p:grpSpPr>
+        <a:xfrm>
+          <a:off x="0" y="0"/>
+          <a:ext cx="0" cy="0"/>
+          <a:chOff x="0" y="0"/>
+          <a:chExt cx="0" cy="0"/>
+        </a:xfrm>
+      </p:grpSpPr>
+      <p:sp>
+        <p:nvSpPr>
+          <p:cNvPr id="2" name="Slide Image Placeholder 1"/>
+          <p:cNvSpPr>
+            <a:spLocks noGrp="1" noRot="1" noChangeAspect="1"/>
+          </p:cNvSpPr>
+          <p:nvPr>
+            <p:ph type="sldImg"/>
+          </p:nvPr>
+        </p:nvSpPr>
+        <p:spPr/>
+      </p:sp>
+      <p:sp>
+        <p:nvSpPr>
+          <p:cNvPr id="3" name="Notes Placeholder 2"/>
+          <p:cNvSpPr>
+            <a:spLocks noGrp="1"/>
+          </p:cNvSpPr>
+          <p:nvPr>
+            <p:ph type="body" idx="1"/>
+          </p:nvPr>
+        </p:nvSpPr>
+        <p:spPr/>
+        <p:txBody>
+          <a:bodyPr/>
+          <a:lstStyle/>
+          <a:p>
+            <a:r>
+              <a:rPr lang="en-AU" dirty="0"/>
+              <a:t>Supervised Learning =&gt; Linear regression</a:t>
+            </a:r>
+          </a:p>
+          <a:p>
+            <a:r>
+              <a:rPr lang="en-AU" dirty="0"/>
+              <a:t>Of course boilerplate code!</a:t>
+            </a:r>
+          </a:p>
+        </p:txBody>
+      </p:sp>
+      <p:sp>
+        <p:nvSpPr>
+          <p:cNvPr id="4" name="Slide Number Placeholder 3"/>
+          <p:cNvSpPr>
+            <a:spLocks noGrp="1"/>
+          </p:cNvSpPr>
+          <p:nvPr>
+            <p:ph type="sldNum" sz="quarter" idx="5"/>
+          </p:nvPr>
+        </p:nvSpPr>
+        <p:spPr/>
+        <p:txBody>
+          <a:bodyPr/>
+          <a:lstStyle/>
+          <a:p>
+            <a:fld id="{021BAEDA-B0F6-47F7-A56B-5E931A6B9DDE}" type="slidenum">
+              <a:rPr lang="en-AU" smtClean="0"/>
+              <a:t>11</a:t>
+            </a:fld>
+            <a:endParaRPr lang="en-AU"/>
+          </a:p>
+        </p:txBody>
+      </p:sp>
+    </p:spTree>
+    <p:extLst>
+      <p:ext uri="{BB962C8B-B14F-4D97-AF65-F5344CB8AC3E}">
+        <p14:creationId xmlns:p14="http://schemas.microsoft.com/office/powerpoint/2010/main" val="68009496"/>
+      </p:ext>
+    </p:extLst>
+  </p:cSld>
+  <p:clrMapOvr>
+    <a:masterClrMapping/>
+  </p:clrMapOvr>
+</p:notes>
+</file>
+
+<file path=ppt/notesSlides/notesSlide3.xml><?xml version="1.0" encoding="utf-8"?>
+<p:notes xmlns:a="http://schemas.openxmlformats.org/drawingml/2006/main" xmlns:r="http://schemas.openxmlformats.org/officeDocument/2006/relationships" xmlns:p="http://schemas.openxmlformats.org/presentationml/2006/main">
+  <p:cSld>
+    <p:spTree>
+      <p:nvGrpSpPr>
+        <p:cNvPr id="1" name=""/>
+        <p:cNvGrpSpPr/>
+        <p:nvPr/>
+      </p:nvGrpSpPr>
+      <p:grpSpPr>
+        <a:xfrm>
+          <a:off x="0" y="0"/>
+          <a:ext cx="0" cy="0"/>
+          <a:chOff x="0" y="0"/>
+          <a:chExt cx="0" cy="0"/>
+        </a:xfrm>
+      </p:grpSpPr>
+      <p:sp>
+        <p:nvSpPr>
+          <p:cNvPr id="2" name="Slide Image Placeholder 1"/>
+          <p:cNvSpPr>
+            <a:spLocks noGrp="1" noRot="1" noChangeAspect="1"/>
+          </p:cNvSpPr>
+          <p:nvPr>
+            <p:ph type="sldImg"/>
+          </p:nvPr>
+        </p:nvSpPr>
+        <p:spPr/>
+      </p:sp>
+      <p:sp>
+        <p:nvSpPr>
+          <p:cNvPr id="3" name="Notes Placeholder 2"/>
+          <p:cNvSpPr>
+            <a:spLocks noGrp="1"/>
+          </p:cNvSpPr>
+          <p:nvPr>
+            <p:ph type="body" idx="1"/>
+          </p:nvPr>
+        </p:nvSpPr>
+        <p:spPr/>
+        <p:txBody>
+          <a:bodyPr/>
+          <a:lstStyle/>
+          <a:p>
+            <a:r>
+              <a:rPr lang="en-AU" dirty="0"/>
+              <a:t>Looking at data:</a:t>
+            </a:r>
+          </a:p>
+          <a:p>
+            <a:r>
+              <a:rPr lang="en-AU" dirty="0"/>
+              <a:t>-Scatterplots indicate linearity</a:t>
+            </a:r>
+          </a:p>
+        </p:txBody>
+      </p:sp>
+      <p:sp>
+        <p:nvSpPr>
+          <p:cNvPr id="4" name="Slide Number Placeholder 3"/>
+          <p:cNvSpPr>
+            <a:spLocks noGrp="1"/>
+          </p:cNvSpPr>
+          <p:nvPr>
+            <p:ph type="sldNum" sz="quarter" idx="5"/>
+          </p:nvPr>
+        </p:nvSpPr>
+        <p:spPr/>
+        <p:txBody>
+          <a:bodyPr/>
+          <a:lstStyle/>
+          <a:p>
+            <a:fld id="{021BAEDA-B0F6-47F7-A56B-5E931A6B9DDE}" type="slidenum">
+              <a:rPr lang="en-AU" smtClean="0"/>
+              <a:t>12</a:t>
+            </a:fld>
+            <a:endParaRPr lang="en-AU"/>
+          </a:p>
+        </p:txBody>
+      </p:sp>
+    </p:spTree>
+    <p:extLst>
+      <p:ext uri="{BB962C8B-B14F-4D97-AF65-F5344CB8AC3E}">
+        <p14:creationId xmlns:p14="http://schemas.microsoft.com/office/powerpoint/2010/main" val="3631797494"/>
+      </p:ext>
+    </p:extLst>
+  </p:cSld>
+  <p:clrMapOvr>
+    <a:masterClrMapping/>
+  </p:clrMapOvr>
+</p:notes>
+</file>
+
+<file path=ppt/notesSlides/notesSlide4.xml><?xml version="1.0" encoding="utf-8"?>
+<p:notes xmlns:a="http://schemas.openxmlformats.org/drawingml/2006/main" xmlns:r="http://schemas.openxmlformats.org/officeDocument/2006/relationships" xmlns:p="http://schemas.openxmlformats.org/presentationml/2006/main">
+  <p:cSld>
+    <p:spTree>
+      <p:nvGrpSpPr>
+        <p:cNvPr id="1" name=""/>
+        <p:cNvGrpSpPr/>
+        <p:nvPr/>
+      </p:nvGrpSpPr>
+      <p:grpSpPr>
+        <a:xfrm>
+          <a:off x="0" y="0"/>
+          <a:ext cx="0" cy="0"/>
+          <a:chOff x="0" y="0"/>
+          <a:chExt cx="0" cy="0"/>
+        </a:xfrm>
+      </p:grpSpPr>
+      <p:sp>
+        <p:nvSpPr>
+          <p:cNvPr id="2" name="Slide Image Placeholder 1"/>
+          <p:cNvSpPr>
+            <a:spLocks noGrp="1" noRot="1" noChangeAspect="1"/>
+          </p:cNvSpPr>
+          <p:nvPr>
+            <p:ph type="sldImg"/>
+          </p:nvPr>
+        </p:nvSpPr>
+        <p:spPr/>
+      </p:sp>
+      <p:sp>
+        <p:nvSpPr>
+          <p:cNvPr id="3" name="Notes Placeholder 2"/>
+          <p:cNvSpPr>
+            <a:spLocks noGrp="1"/>
+          </p:cNvSpPr>
+          <p:nvPr>
+            <p:ph type="body" idx="1"/>
+          </p:nvPr>
+        </p:nvSpPr>
+        <p:spPr/>
+        <p:txBody>
+          <a:bodyPr/>
+          <a:lstStyle/>
+          <a:p>
+            <a:r>
+              <a:rPr lang="en-AU" dirty="0"/>
+              <a:t>Couldn’t:</a:t>
+            </a:r>
+          </a:p>
+          <a:p>
+            <a:r>
+              <a:rPr lang="en-AU" dirty="0"/>
+              <a:t>-Increase accuracy</a:t>
+            </a:r>
+          </a:p>
+          <a:p>
+            <a:r>
+              <a:rPr lang="en-AU" dirty="0"/>
+              <a:t>-Export model</a:t>
+            </a:r>
+          </a:p>
+          <a:p>
+            <a:r>
+              <a:rPr lang="en-AU" dirty="0"/>
+              <a:t>What can we do? What did others do?</a:t>
+            </a:r>
+          </a:p>
+        </p:txBody>
+      </p:sp>
+      <p:sp>
+        <p:nvSpPr>
+          <p:cNvPr id="4" name="Slide Number Placeholder 3"/>
+          <p:cNvSpPr>
+            <a:spLocks noGrp="1"/>
+          </p:cNvSpPr>
+          <p:nvPr>
+            <p:ph type="sldNum" sz="quarter" idx="5"/>
+          </p:nvPr>
+        </p:nvSpPr>
+        <p:spPr/>
+        <p:txBody>
+          <a:bodyPr/>
+          <a:lstStyle/>
+          <a:p>
+            <a:fld id="{021BAEDA-B0F6-47F7-A56B-5E931A6B9DDE}" type="slidenum">
+              <a:rPr lang="en-AU" smtClean="0"/>
+              <a:t>13</a:t>
+            </a:fld>
+            <a:endParaRPr lang="en-AU"/>
+          </a:p>
+        </p:txBody>
+      </p:sp>
+    </p:spTree>
+    <p:extLst>
+      <p:ext uri="{BB962C8B-B14F-4D97-AF65-F5344CB8AC3E}">
+        <p14:creationId xmlns:p14="http://schemas.microsoft.com/office/powerpoint/2010/main" val="89602278"/>
+      </p:ext>
+    </p:extLst>
+  </p:cSld>
+  <p:clrMapOvr>
+    <a:masterClrMapping/>
+  </p:clrMapOvr>
+</p:notes>
+</file>
+
+<file path=ppt/notesSlides/notesSlide5.xml><?xml version="1.0" encoding="utf-8"?>
+<p:notes xmlns:a="http://schemas.openxmlformats.org/drawingml/2006/main" xmlns:r="http://schemas.openxmlformats.org/officeDocument/2006/relationships" xmlns:p="http://schemas.openxmlformats.org/presentationml/2006/main">
+  <p:cSld>
+    <p:spTree>
+      <p:nvGrpSpPr>
+        <p:cNvPr id="1" name=""/>
+        <p:cNvGrpSpPr/>
+        <p:nvPr/>
+      </p:nvGrpSpPr>
+      <p:grpSpPr>
+        <a:xfrm>
+          <a:off x="0" y="0"/>
+          <a:ext cx="0" cy="0"/>
+          <a:chOff x="0" y="0"/>
+          <a:chExt cx="0" cy="0"/>
+        </a:xfrm>
+      </p:grpSpPr>
+      <p:sp>
+        <p:nvSpPr>
+          <p:cNvPr id="2" name="Slide Image Placeholder 1"/>
+          <p:cNvSpPr>
+            <a:spLocks noGrp="1" noRot="1" noChangeAspect="1"/>
+          </p:cNvSpPr>
+          <p:nvPr>
+            <p:ph type="sldImg"/>
+          </p:nvPr>
+        </p:nvSpPr>
+        <p:spPr/>
+      </p:sp>
+      <p:sp>
+        <p:nvSpPr>
+          <p:cNvPr id="3" name="Notes Placeholder 2"/>
+          <p:cNvSpPr>
+            <a:spLocks noGrp="1"/>
+          </p:cNvSpPr>
+          <p:nvPr>
+            <p:ph type="body" idx="1"/>
+          </p:nvPr>
+        </p:nvSpPr>
+        <p:spPr/>
+        <p:txBody>
+          <a:bodyPr/>
+          <a:lstStyle/>
+          <a:p>
+            <a:r>
+              <a:rPr lang="en-AU" dirty="0"/>
+              <a:t>Looking at other’s methods &amp; data:</a:t>
+            </a:r>
+          </a:p>
+          <a:p>
+            <a:r>
+              <a:rPr lang="en-AU" dirty="0"/>
+              <a:t>-Check for multicollinearity: None! - variables do not interfere with correlations</a:t>
+            </a:r>
+          </a:p>
+          <a:p>
+            <a:r>
+              <a:rPr lang="en-AU" dirty="0"/>
+              <a:t>-Support for linear regression, on top of using numerical data to predict numerical data</a:t>
+            </a:r>
+          </a:p>
+          <a:p>
+            <a:r>
+              <a:rPr lang="en-AU" dirty="0"/>
+              <a:t>-More models!</a:t>
+            </a:r>
+          </a:p>
+        </p:txBody>
+      </p:sp>
+      <p:sp>
+        <p:nvSpPr>
+          <p:cNvPr id="4" name="Slide Number Placeholder 3"/>
+          <p:cNvSpPr>
+            <a:spLocks noGrp="1"/>
+          </p:cNvSpPr>
+          <p:nvPr>
+            <p:ph type="sldNum" sz="quarter" idx="5"/>
+          </p:nvPr>
+        </p:nvSpPr>
+        <p:spPr/>
+        <p:txBody>
+          <a:bodyPr/>
+          <a:lstStyle/>
+          <a:p>
+            <a:fld id="{021BAEDA-B0F6-47F7-A56B-5E931A6B9DDE}" type="slidenum">
+              <a:rPr lang="en-AU" smtClean="0"/>
+              <a:t>14</a:t>
+            </a:fld>
+            <a:endParaRPr lang="en-AU"/>
+          </a:p>
+        </p:txBody>
+      </p:sp>
+    </p:spTree>
+    <p:extLst>
+      <p:ext uri="{BB962C8B-B14F-4D97-AF65-F5344CB8AC3E}">
+        <p14:creationId xmlns:p14="http://schemas.microsoft.com/office/powerpoint/2010/main" val="1973470178"/>
+      </p:ext>
+    </p:extLst>
+  </p:cSld>
+  <p:clrMapOvr>
+    <a:masterClrMapping/>
+  </p:clrMapOvr>
+</p:notes>
+</file>
+
+<file path=ppt/notesSlides/notesSlide6.xml><?xml version="1.0" encoding="utf-8"?>
+<p:notes xmlns:a="http://schemas.openxmlformats.org/drawingml/2006/main" xmlns:r="http://schemas.openxmlformats.org/officeDocument/2006/relationships" xmlns:p="http://schemas.openxmlformats.org/presentationml/2006/main">
+  <p:cSld>
+    <p:spTree>
+      <p:nvGrpSpPr>
+        <p:cNvPr id="1" name=""/>
+        <p:cNvGrpSpPr/>
+        <p:nvPr/>
+      </p:nvGrpSpPr>
+      <p:grpSpPr>
+        <a:xfrm>
+          <a:off x="0" y="0"/>
+          <a:ext cx="0" cy="0"/>
+          <a:chOff x="0" y="0"/>
+          <a:chExt cx="0" cy="0"/>
+        </a:xfrm>
+      </p:grpSpPr>
+      <p:sp>
+        <p:nvSpPr>
+          <p:cNvPr id="2" name="Slide Image Placeholder 1"/>
+          <p:cNvSpPr>
+            <a:spLocks noGrp="1" noRot="1" noChangeAspect="1"/>
+          </p:cNvSpPr>
+          <p:nvPr>
+            <p:ph type="sldImg"/>
+          </p:nvPr>
+        </p:nvSpPr>
+        <p:spPr/>
+      </p:sp>
+      <p:sp>
+        <p:nvSpPr>
+          <p:cNvPr id="3" name="Notes Placeholder 2"/>
+          <p:cNvSpPr>
+            <a:spLocks noGrp="1"/>
+          </p:cNvSpPr>
+          <p:nvPr>
+            <p:ph type="body" idx="1"/>
+          </p:nvPr>
+        </p:nvSpPr>
+        <p:spPr/>
+        <p:txBody>
+          <a:bodyPr/>
+          <a:lstStyle/>
+          <a:p>
+            <a:r>
+              <a:rPr lang="en-AU" dirty="0"/>
+              <a:t>Models work but huge trade off between quickness and complexity &amp; accuracy</a:t>
+            </a:r>
+          </a:p>
+        </p:txBody>
+      </p:sp>
+      <p:sp>
+        <p:nvSpPr>
+          <p:cNvPr id="4" name="Slide Number Placeholder 3"/>
+          <p:cNvSpPr>
+            <a:spLocks noGrp="1"/>
+          </p:cNvSpPr>
+          <p:nvPr>
+            <p:ph type="sldNum" sz="quarter" idx="5"/>
+          </p:nvPr>
+        </p:nvSpPr>
+        <p:spPr/>
+        <p:txBody>
+          <a:bodyPr/>
+          <a:lstStyle/>
+          <a:p>
+            <a:fld id="{021BAEDA-B0F6-47F7-A56B-5E931A6B9DDE}" type="slidenum">
+              <a:rPr lang="en-AU" smtClean="0"/>
+              <a:t>15</a:t>
+            </a:fld>
+            <a:endParaRPr lang="en-AU"/>
+          </a:p>
+        </p:txBody>
+      </p:sp>
+    </p:spTree>
+    <p:extLst>
+      <p:ext uri="{BB962C8B-B14F-4D97-AF65-F5344CB8AC3E}">
+        <p14:creationId xmlns:p14="http://schemas.microsoft.com/office/powerpoint/2010/main" val="1646767114"/>
+      </p:ext>
+    </p:extLst>
+  </p:cSld>
+  <p:clrMapOvr>
+    <a:masterClrMapping/>
+  </p:clrMapOvr>
+</p:notes>
+</file>
+
+<file path=ppt/notesSlides/notesSlide7.xml><?xml version="1.0" encoding="utf-8"?>
+<p:notes xmlns:a="http://schemas.openxmlformats.org/drawingml/2006/main" xmlns:r="http://schemas.openxmlformats.org/officeDocument/2006/relationships" xmlns:p="http://schemas.openxmlformats.org/presentationml/2006/main">
+  <p:cSld>
+    <p:spTree>
+      <p:nvGrpSpPr>
+        <p:cNvPr id="1" name=""/>
+        <p:cNvGrpSpPr/>
+        <p:nvPr/>
+      </p:nvGrpSpPr>
+      <p:grpSpPr>
+        <a:xfrm>
+          <a:off x="0" y="0"/>
+          <a:ext cx="0" cy="0"/>
+          <a:chOff x="0" y="0"/>
+          <a:chExt cx="0" cy="0"/>
+        </a:xfrm>
+      </p:grpSpPr>
+      <p:sp>
+        <p:nvSpPr>
+          <p:cNvPr id="2" name="Slide Image Placeholder 1"/>
+          <p:cNvSpPr>
+            <a:spLocks noGrp="1" noRot="1" noChangeAspect="1"/>
+          </p:cNvSpPr>
+          <p:nvPr>
+            <p:ph type="sldImg"/>
+          </p:nvPr>
+        </p:nvSpPr>
+        <p:spPr/>
+      </p:sp>
+      <p:sp>
+        <p:nvSpPr>
+          <p:cNvPr id="3" name="Notes Placeholder 2"/>
+          <p:cNvSpPr>
+            <a:spLocks noGrp="1"/>
+          </p:cNvSpPr>
+          <p:nvPr>
+            <p:ph type="body" idx="1"/>
+          </p:nvPr>
+        </p:nvSpPr>
+        <p:spPr/>
+        <p:txBody>
+          <a:bodyPr/>
+          <a:lstStyle/>
+          <a:p>
+            <a:r>
+              <a:rPr lang="en-AU" dirty="0"/>
+              <a:t>Could not progress from here.</a:t>
+            </a:r>
+          </a:p>
+        </p:txBody>
+      </p:sp>
+      <p:sp>
+        <p:nvSpPr>
+          <p:cNvPr id="4" name="Slide Number Placeholder 3"/>
+          <p:cNvSpPr>
+            <a:spLocks noGrp="1"/>
+          </p:cNvSpPr>
+          <p:nvPr>
+            <p:ph type="sldNum" sz="quarter" idx="5"/>
+          </p:nvPr>
+        </p:nvSpPr>
+        <p:spPr/>
+        <p:txBody>
+          <a:bodyPr/>
+          <a:lstStyle/>
+          <a:p>
+            <a:fld id="{021BAEDA-B0F6-47F7-A56B-5E931A6B9DDE}" type="slidenum">
+              <a:rPr lang="en-AU" smtClean="0"/>
+              <a:t>16</a:t>
+            </a:fld>
+            <a:endParaRPr lang="en-AU"/>
+          </a:p>
+        </p:txBody>
+      </p:sp>
+    </p:spTree>
+    <p:extLst>
+      <p:ext uri="{BB962C8B-B14F-4D97-AF65-F5344CB8AC3E}">
+        <p14:creationId xmlns:p14="http://schemas.microsoft.com/office/powerpoint/2010/main" val="279255869"/>
+      </p:ext>
+    </p:extLst>
+  </p:cSld>
+  <p:clrMapOvr>
+    <a:masterClrMapping/>
+  </p:clrMapOvr>
+</p:notes>
+</file>
+
+<file path=ppt/notesSlides/notesSlide8.xml><?xml version="1.0" encoding="utf-8"?>
+<p:notes xmlns:a="http://schemas.openxmlformats.org/drawingml/2006/main" xmlns:r="http://schemas.openxmlformats.org/officeDocument/2006/relationships" xmlns:p="http://schemas.openxmlformats.org/presentationml/2006/main">
+  <p:cSld>
+    <p:spTree>
+      <p:nvGrpSpPr>
+        <p:cNvPr id="1" name=""/>
+        <p:cNvGrpSpPr/>
+        <p:nvPr/>
+      </p:nvGrpSpPr>
+      <p:grpSpPr>
+        <a:xfrm>
+          <a:off x="0" y="0"/>
+          <a:ext cx="0" cy="0"/>
+          <a:chOff x="0" y="0"/>
+          <a:chExt cx="0" cy="0"/>
+        </a:xfrm>
+      </p:grpSpPr>
+      <p:sp>
+        <p:nvSpPr>
+          <p:cNvPr id="2" name="Slide Image Placeholder 1"/>
+          <p:cNvSpPr>
+            <a:spLocks noGrp="1" noRot="1" noChangeAspect="1"/>
+          </p:cNvSpPr>
+          <p:nvPr>
+            <p:ph type="sldImg"/>
+          </p:nvPr>
+        </p:nvSpPr>
+        <p:spPr/>
+      </p:sp>
+      <p:sp>
+        <p:nvSpPr>
+          <p:cNvPr id="3" name="Notes Placeholder 2"/>
+          <p:cNvSpPr>
+            <a:spLocks noGrp="1"/>
+          </p:cNvSpPr>
+          <p:nvPr>
+            <p:ph type="body" idx="1"/>
+          </p:nvPr>
+        </p:nvSpPr>
+        <p:spPr/>
+        <p:txBody>
+          <a:bodyPr/>
+          <a:lstStyle/>
+          <a:p>
+            <a:r>
+              <a:rPr lang="en-AU" dirty="0"/>
+              <a:t>Realised we needed to revise last few steps to better apply concept of ML:</a:t>
+            </a:r>
+          </a:p>
+          <a:p>
+            <a:r>
+              <a:rPr lang="en-AU" dirty="0"/>
+              <a:t>-Further manipulate dataset to input expected outcomes LR, which improves training and testing</a:t>
+            </a:r>
+          </a:p>
+          <a:p>
+            <a:r>
+              <a:rPr lang="en-AU" dirty="0"/>
+              <a:t>-Match predictions based on website input variables to allow for LR to give maximum # of hits</a:t>
+            </a:r>
+          </a:p>
+        </p:txBody>
+      </p:sp>
+      <p:sp>
+        <p:nvSpPr>
+          <p:cNvPr id="4" name="Slide Number Placeholder 3"/>
+          <p:cNvSpPr>
+            <a:spLocks noGrp="1"/>
+          </p:cNvSpPr>
+          <p:nvPr>
+            <p:ph type="sldNum" sz="quarter" idx="5"/>
+          </p:nvPr>
+        </p:nvSpPr>
+        <p:spPr/>
+        <p:txBody>
+          <a:bodyPr/>
+          <a:lstStyle/>
+          <a:p>
+            <a:fld id="{021BAEDA-B0F6-47F7-A56B-5E931A6B9DDE}" type="slidenum">
+              <a:rPr lang="en-AU" smtClean="0"/>
+              <a:t>17</a:t>
+            </a:fld>
+            <a:endParaRPr lang="en-AU"/>
+          </a:p>
+        </p:txBody>
+      </p:sp>
+    </p:spTree>
+    <p:extLst>
+      <p:ext uri="{BB962C8B-B14F-4D97-AF65-F5344CB8AC3E}">
+        <p14:creationId xmlns:p14="http://schemas.microsoft.com/office/powerpoint/2010/main" val="213426124"/>
+      </p:ext>
+    </p:extLst>
+  </p:cSld>
+  <p:clrMapOvr>
+    <a:masterClrMapping/>
+  </p:clrMapOvr>
+</p:notes>
+</file>
+
+<file path=ppt/notesSlides/notesSlide9.xml><?xml version="1.0" encoding="utf-8"?>
+<p:notes xmlns:a="http://schemas.openxmlformats.org/drawingml/2006/main" xmlns:r="http://schemas.openxmlformats.org/officeDocument/2006/relationships" xmlns:p="http://schemas.openxmlformats.org/presentationml/2006/main">
+  <p:cSld>
+    <p:spTree>
+      <p:nvGrpSpPr>
+        <p:cNvPr id="1" name=""/>
+        <p:cNvGrpSpPr/>
+        <p:nvPr/>
+      </p:nvGrpSpPr>
+      <p:grpSpPr>
+        <a:xfrm>
+          <a:off x="0" y="0"/>
+          <a:ext cx="0" cy="0"/>
+          <a:chOff x="0" y="0"/>
+          <a:chExt cx="0" cy="0"/>
+        </a:xfrm>
+      </p:grpSpPr>
+      <p:sp>
+        <p:nvSpPr>
+          <p:cNvPr id="2" name="Slide Image Placeholder 1"/>
+          <p:cNvSpPr>
+            <a:spLocks noGrp="1" noRot="1" noChangeAspect="1"/>
+          </p:cNvSpPr>
+          <p:nvPr>
+            <p:ph type="sldImg"/>
+          </p:nvPr>
+        </p:nvSpPr>
+        <p:spPr/>
+      </p:sp>
+      <p:sp>
+        <p:nvSpPr>
+          <p:cNvPr id="3" name="Notes Placeholder 2"/>
+          <p:cNvSpPr>
+            <a:spLocks noGrp="1"/>
+          </p:cNvSpPr>
+          <p:nvPr>
+            <p:ph type="body" idx="1"/>
+          </p:nvPr>
+        </p:nvSpPr>
+        <p:spPr/>
+        <p:txBody>
+          <a:bodyPr/>
+          <a:lstStyle/>
+          <a:p>
+            <a:endParaRPr lang="en-AU" dirty="0"/>
+          </a:p>
+        </p:txBody>
+      </p:sp>
+      <p:sp>
+        <p:nvSpPr>
+          <p:cNvPr id="4" name="Slide Number Placeholder 3"/>
+          <p:cNvSpPr>
+            <a:spLocks noGrp="1"/>
+          </p:cNvSpPr>
+          <p:nvPr>
+            <p:ph type="sldNum" sz="quarter" idx="5"/>
+          </p:nvPr>
+        </p:nvSpPr>
+        <p:spPr/>
+        <p:txBody>
+          <a:bodyPr/>
+          <a:lstStyle/>
+          <a:p>
+            <a:fld id="{021BAEDA-B0F6-47F7-A56B-5E931A6B9DDE}" type="slidenum">
+              <a:rPr lang="en-AU" smtClean="0"/>
+              <a:t>18</a:t>
+            </a:fld>
+            <a:endParaRPr lang="en-AU"/>
+          </a:p>
+        </p:txBody>
+      </p:sp>
+    </p:spTree>
+    <p:extLst>
+      <p:ext uri="{BB962C8B-B14F-4D97-AF65-F5344CB8AC3E}">
+        <p14:creationId xmlns:p14="http://schemas.microsoft.com/office/powerpoint/2010/main" val="4104924297"/>
+      </p:ext>
+    </p:extLst>
+  </p:cSld>
+  <p:clrMapOvr>
+    <a:masterClrMapping/>
+  </p:clrMapOvr>
+</p:notes>
 </file>
 
 <file path=ppt/slideLayouts/slideLayout1.xml><?xml version="1.0" encoding="utf-8"?>
@@ -4448,6 +5296,1837 @@
 <file path=ppt/slides/slide10.xml><?xml version="1.0" encoding="utf-8"?>
 <p:sld xmlns:a="http://schemas.openxmlformats.org/drawingml/2006/main" xmlns:r="http://schemas.openxmlformats.org/officeDocument/2006/relationships" xmlns:p="http://schemas.openxmlformats.org/presentationml/2006/main">
   <p:cSld>
+    <p:spTree>
+      <p:nvGrpSpPr>
+        <p:cNvPr id="1" name=""/>
+        <p:cNvGrpSpPr/>
+        <p:nvPr/>
+      </p:nvGrpSpPr>
+      <p:grpSpPr>
+        <a:xfrm>
+          <a:off x="0" y="0"/>
+          <a:ext cx="0" cy="0"/>
+          <a:chOff x="0" y="0"/>
+          <a:chExt cx="0" cy="0"/>
+        </a:xfrm>
+      </p:grpSpPr>
+      <p:sp>
+        <p:nvSpPr>
+          <p:cNvPr id="2" name="Title 1">
+            <a:extLst>
+              <a:ext uri="{FF2B5EF4-FFF2-40B4-BE49-F238E27FC236}">
+                <a16:creationId xmlns:a16="http://schemas.microsoft.com/office/drawing/2014/main" id="{19FA2153-3168-4605-B8BD-7EE4E3EACE78}"/>
+              </a:ext>
+            </a:extLst>
+          </p:cNvPr>
+          <p:cNvSpPr>
+            <a:spLocks noGrp="1"/>
+          </p:cNvSpPr>
+          <p:nvPr>
+            <p:ph type="title"/>
+          </p:nvPr>
+        </p:nvSpPr>
+        <p:spPr/>
+        <p:txBody>
+          <a:bodyPr/>
+          <a:lstStyle/>
+          <a:p>
+            <a:r>
+              <a:rPr lang="en-AU" dirty="0"/>
+              <a:t>Machine Learning</a:t>
+            </a:r>
+          </a:p>
+        </p:txBody>
+      </p:sp>
+      <p:sp>
+        <p:nvSpPr>
+          <p:cNvPr id="3" name="Content Placeholder 2">
+            <a:extLst>
+              <a:ext uri="{FF2B5EF4-FFF2-40B4-BE49-F238E27FC236}">
+                <a16:creationId xmlns:a16="http://schemas.microsoft.com/office/drawing/2014/main" id="{B00C9427-135D-430D-B9B9-A0112A48F98B}"/>
+              </a:ext>
+            </a:extLst>
+          </p:cNvPr>
+          <p:cNvSpPr>
+            <a:spLocks noGrp="1"/>
+          </p:cNvSpPr>
+          <p:nvPr>
+            <p:ph idx="1"/>
+          </p:nvPr>
+        </p:nvSpPr>
+        <p:spPr/>
+        <p:txBody>
+          <a:bodyPr/>
+          <a:lstStyle/>
+          <a:p>
+            <a:pPr>
+              <a:buFont typeface="Arial" panose="020B0604020202020204" pitchFamily="34" charset="0"/>
+              <a:buChar char="•"/>
+            </a:pPr>
+            <a:r>
+              <a:rPr lang="en-AU" dirty="0"/>
+              <a:t>Apply what we learned</a:t>
+            </a:r>
+          </a:p>
+        </p:txBody>
+      </p:sp>
+      <p:sp>
+        <p:nvSpPr>
+          <p:cNvPr id="4" name="Footer Placeholder 3">
+            <a:extLst>
+              <a:ext uri="{FF2B5EF4-FFF2-40B4-BE49-F238E27FC236}">
+                <a16:creationId xmlns:a16="http://schemas.microsoft.com/office/drawing/2014/main" id="{73E61296-D2A2-4D7A-A859-38C48AE06C04}"/>
+              </a:ext>
+            </a:extLst>
+          </p:cNvPr>
+          <p:cNvSpPr>
+            <a:spLocks noGrp="1"/>
+          </p:cNvSpPr>
+          <p:nvPr>
+            <p:ph type="ftr" sz="quarter" idx="11"/>
+          </p:nvPr>
+        </p:nvSpPr>
+        <p:spPr/>
+        <p:txBody>
+          <a:bodyPr/>
+          <a:lstStyle/>
+          <a:p>
+            <a:r>
+              <a:rPr lang="en-US"/>
+              <a:t>houseprice-project.herokuapp.com</a:t>
+            </a:r>
+            <a:endParaRPr lang="en-US" dirty="0"/>
+          </a:p>
+        </p:txBody>
+      </p:sp>
+      <p:pic>
+        <p:nvPicPr>
+          <p:cNvPr id="9" name="Picture 8">
+            <a:extLst>
+              <a:ext uri="{FF2B5EF4-FFF2-40B4-BE49-F238E27FC236}">
+                <a16:creationId xmlns:a16="http://schemas.microsoft.com/office/drawing/2014/main" id="{58521B36-81AA-42AD-B3EB-22A466F89426}"/>
+              </a:ext>
+            </a:extLst>
+          </p:cNvPr>
+          <p:cNvPicPr>
+            <a:picLocks noChangeAspect="1"/>
+          </p:cNvPicPr>
+          <p:nvPr/>
+        </p:nvPicPr>
+        <p:blipFill>
+          <a:blip r:embed="rId3"/>
+          <a:stretch>
+            <a:fillRect/>
+          </a:stretch>
+        </p:blipFill>
+        <p:spPr>
+          <a:xfrm>
+            <a:off x="4829175" y="1918291"/>
+            <a:ext cx="6340793" cy="4483230"/>
+          </a:xfrm>
+          <a:prstGeom prst="rect">
+            <a:avLst/>
+          </a:prstGeom>
+        </p:spPr>
+      </p:pic>
+    </p:spTree>
+    <p:extLst>
+      <p:ext uri="{BB962C8B-B14F-4D97-AF65-F5344CB8AC3E}">
+        <p14:creationId xmlns:p14="http://schemas.microsoft.com/office/powerpoint/2010/main" val="1819410993"/>
+      </p:ext>
+    </p:extLst>
+  </p:cSld>
+  <p:clrMapOvr>
+    <a:masterClrMapping/>
+  </p:clrMapOvr>
+</p:sld>
+</file>
+
+<file path=ppt/slides/slide11.xml><?xml version="1.0" encoding="utf-8"?>
+<p:sld xmlns:a="http://schemas.openxmlformats.org/drawingml/2006/main" xmlns:r="http://schemas.openxmlformats.org/officeDocument/2006/relationships" xmlns:p="http://schemas.openxmlformats.org/presentationml/2006/main">
+  <p:cSld>
+    <p:spTree>
+      <p:nvGrpSpPr>
+        <p:cNvPr id="1" name=""/>
+        <p:cNvGrpSpPr/>
+        <p:nvPr/>
+      </p:nvGrpSpPr>
+      <p:grpSpPr>
+        <a:xfrm>
+          <a:off x="0" y="0"/>
+          <a:ext cx="0" cy="0"/>
+          <a:chOff x="0" y="0"/>
+          <a:chExt cx="0" cy="0"/>
+        </a:xfrm>
+      </p:grpSpPr>
+      <p:sp>
+        <p:nvSpPr>
+          <p:cNvPr id="2" name="Title 1">
+            <a:extLst>
+              <a:ext uri="{FF2B5EF4-FFF2-40B4-BE49-F238E27FC236}">
+                <a16:creationId xmlns:a16="http://schemas.microsoft.com/office/drawing/2014/main" id="{19FA2153-3168-4605-B8BD-7EE4E3EACE78}"/>
+              </a:ext>
+            </a:extLst>
+          </p:cNvPr>
+          <p:cNvSpPr>
+            <a:spLocks noGrp="1"/>
+          </p:cNvSpPr>
+          <p:nvPr>
+            <p:ph type="title"/>
+          </p:nvPr>
+        </p:nvSpPr>
+        <p:spPr/>
+        <p:txBody>
+          <a:bodyPr/>
+          <a:lstStyle/>
+          <a:p>
+            <a:r>
+              <a:rPr lang="en-AU" dirty="0"/>
+              <a:t>Machine Learning</a:t>
+            </a:r>
+          </a:p>
+        </p:txBody>
+      </p:sp>
+      <p:sp>
+        <p:nvSpPr>
+          <p:cNvPr id="3" name="Content Placeholder 2">
+            <a:extLst>
+              <a:ext uri="{FF2B5EF4-FFF2-40B4-BE49-F238E27FC236}">
+                <a16:creationId xmlns:a16="http://schemas.microsoft.com/office/drawing/2014/main" id="{B00C9427-135D-430D-B9B9-A0112A48F98B}"/>
+              </a:ext>
+            </a:extLst>
+          </p:cNvPr>
+          <p:cNvSpPr>
+            <a:spLocks noGrp="1"/>
+          </p:cNvSpPr>
+          <p:nvPr>
+            <p:ph idx="1"/>
+          </p:nvPr>
+        </p:nvSpPr>
+        <p:spPr/>
+        <p:txBody>
+          <a:bodyPr/>
+          <a:lstStyle/>
+          <a:p>
+            <a:pPr>
+              <a:buFont typeface="Arial" panose="020B0604020202020204" pitchFamily="34" charset="0"/>
+              <a:buChar char="•"/>
+            </a:pPr>
+            <a:r>
+              <a:rPr lang="en-AU" dirty="0"/>
+              <a:t>Linear Regression</a:t>
+            </a:r>
+          </a:p>
+          <a:p>
+            <a:pPr>
+              <a:buFont typeface="Arial" panose="020B0604020202020204" pitchFamily="34" charset="0"/>
+              <a:buChar char="•"/>
+            </a:pPr>
+            <a:r>
+              <a:rPr lang="en-AU" dirty="0"/>
+              <a:t>Boilerplate code!</a:t>
+            </a:r>
+          </a:p>
+        </p:txBody>
+      </p:sp>
+      <p:sp>
+        <p:nvSpPr>
+          <p:cNvPr id="4" name="Footer Placeholder 3">
+            <a:extLst>
+              <a:ext uri="{FF2B5EF4-FFF2-40B4-BE49-F238E27FC236}">
+                <a16:creationId xmlns:a16="http://schemas.microsoft.com/office/drawing/2014/main" id="{73E61296-D2A2-4D7A-A859-38C48AE06C04}"/>
+              </a:ext>
+            </a:extLst>
+          </p:cNvPr>
+          <p:cNvSpPr>
+            <a:spLocks noGrp="1"/>
+          </p:cNvSpPr>
+          <p:nvPr>
+            <p:ph type="ftr" sz="quarter" idx="11"/>
+          </p:nvPr>
+        </p:nvSpPr>
+        <p:spPr/>
+        <p:txBody>
+          <a:bodyPr/>
+          <a:lstStyle/>
+          <a:p>
+            <a:r>
+              <a:rPr lang="en-US"/>
+              <a:t>houseprice-project.herokuapp.com</a:t>
+            </a:r>
+            <a:endParaRPr lang="en-US" dirty="0"/>
+          </a:p>
+        </p:txBody>
+      </p:sp>
+      <p:pic>
+        <p:nvPicPr>
+          <p:cNvPr id="8" name="Picture 7">
+            <a:extLst>
+              <a:ext uri="{FF2B5EF4-FFF2-40B4-BE49-F238E27FC236}">
+                <a16:creationId xmlns:a16="http://schemas.microsoft.com/office/drawing/2014/main" id="{98E606D2-675C-4B67-BBA4-01418AC2DDA9}"/>
+              </a:ext>
+            </a:extLst>
+          </p:cNvPr>
+          <p:cNvPicPr>
+            <a:picLocks noChangeAspect="1"/>
+          </p:cNvPicPr>
+          <p:nvPr/>
+        </p:nvPicPr>
+        <p:blipFill>
+          <a:blip r:embed="rId3"/>
+          <a:stretch>
+            <a:fillRect/>
+          </a:stretch>
+        </p:blipFill>
+        <p:spPr>
+          <a:xfrm>
+            <a:off x="4892332" y="1904456"/>
+            <a:ext cx="6276975" cy="4295775"/>
+          </a:xfrm>
+          <a:prstGeom prst="rect">
+            <a:avLst/>
+          </a:prstGeom>
+        </p:spPr>
+      </p:pic>
+      <p:pic>
+        <p:nvPicPr>
+          <p:cNvPr id="6" name="Picture 5">
+            <a:extLst>
+              <a:ext uri="{FF2B5EF4-FFF2-40B4-BE49-F238E27FC236}">
+                <a16:creationId xmlns:a16="http://schemas.microsoft.com/office/drawing/2014/main" id="{DDCA45B4-DBFC-4E9E-95D1-A2B8548744DF}"/>
+              </a:ext>
+            </a:extLst>
+          </p:cNvPr>
+          <p:cNvPicPr>
+            <a:picLocks noChangeAspect="1"/>
+          </p:cNvPicPr>
+          <p:nvPr/>
+        </p:nvPicPr>
+        <p:blipFill>
+          <a:blip r:embed="rId4"/>
+          <a:stretch>
+            <a:fillRect/>
+          </a:stretch>
+        </p:blipFill>
+        <p:spPr>
+          <a:xfrm>
+            <a:off x="188075" y="3247481"/>
+            <a:ext cx="4533900" cy="2952750"/>
+          </a:xfrm>
+          <a:prstGeom prst="rect">
+            <a:avLst/>
+          </a:prstGeom>
+        </p:spPr>
+      </p:pic>
+    </p:spTree>
+    <p:extLst>
+      <p:ext uri="{BB962C8B-B14F-4D97-AF65-F5344CB8AC3E}">
+        <p14:creationId xmlns:p14="http://schemas.microsoft.com/office/powerpoint/2010/main" val="683028785"/>
+      </p:ext>
+    </p:extLst>
+  </p:cSld>
+  <p:clrMapOvr>
+    <a:masterClrMapping/>
+  </p:clrMapOvr>
+</p:sld>
+</file>
+
+<file path=ppt/slides/slide12.xml><?xml version="1.0" encoding="utf-8"?>
+<p:sld xmlns:a="http://schemas.openxmlformats.org/drawingml/2006/main" xmlns:r="http://schemas.openxmlformats.org/officeDocument/2006/relationships" xmlns:p="http://schemas.openxmlformats.org/presentationml/2006/main">
+  <p:cSld>
+    <p:spTree>
+      <p:nvGrpSpPr>
+        <p:cNvPr id="1" name=""/>
+        <p:cNvGrpSpPr/>
+        <p:nvPr/>
+      </p:nvGrpSpPr>
+      <p:grpSpPr>
+        <a:xfrm>
+          <a:off x="0" y="0"/>
+          <a:ext cx="0" cy="0"/>
+          <a:chOff x="0" y="0"/>
+          <a:chExt cx="0" cy="0"/>
+        </a:xfrm>
+      </p:grpSpPr>
+      <p:sp>
+        <p:nvSpPr>
+          <p:cNvPr id="2" name="Title 1">
+            <a:extLst>
+              <a:ext uri="{FF2B5EF4-FFF2-40B4-BE49-F238E27FC236}">
+                <a16:creationId xmlns:a16="http://schemas.microsoft.com/office/drawing/2014/main" id="{19FA2153-3168-4605-B8BD-7EE4E3EACE78}"/>
+              </a:ext>
+            </a:extLst>
+          </p:cNvPr>
+          <p:cNvSpPr>
+            <a:spLocks noGrp="1"/>
+          </p:cNvSpPr>
+          <p:nvPr>
+            <p:ph type="title"/>
+          </p:nvPr>
+        </p:nvSpPr>
+        <p:spPr/>
+        <p:txBody>
+          <a:bodyPr/>
+          <a:lstStyle/>
+          <a:p>
+            <a:r>
+              <a:rPr lang="en-AU" dirty="0"/>
+              <a:t>Machine Learning</a:t>
+            </a:r>
+          </a:p>
+        </p:txBody>
+      </p:sp>
+      <p:sp>
+        <p:nvSpPr>
+          <p:cNvPr id="3" name="Content Placeholder 2">
+            <a:extLst>
+              <a:ext uri="{FF2B5EF4-FFF2-40B4-BE49-F238E27FC236}">
+                <a16:creationId xmlns:a16="http://schemas.microsoft.com/office/drawing/2014/main" id="{B00C9427-135D-430D-B9B9-A0112A48F98B}"/>
+              </a:ext>
+            </a:extLst>
+          </p:cNvPr>
+          <p:cNvSpPr>
+            <a:spLocks noGrp="1"/>
+          </p:cNvSpPr>
+          <p:nvPr>
+            <p:ph idx="1"/>
+          </p:nvPr>
+        </p:nvSpPr>
+        <p:spPr/>
+        <p:txBody>
+          <a:bodyPr/>
+          <a:lstStyle/>
+          <a:p>
+            <a:pPr>
+              <a:buFont typeface="Arial" panose="020B0604020202020204" pitchFamily="34" charset="0"/>
+              <a:buChar char="•"/>
+            </a:pPr>
+            <a:r>
+              <a:rPr lang="en-AU" dirty="0"/>
+              <a:t>Progress!</a:t>
+            </a:r>
+          </a:p>
+        </p:txBody>
+      </p:sp>
+      <p:sp>
+        <p:nvSpPr>
+          <p:cNvPr id="4" name="Footer Placeholder 3">
+            <a:extLst>
+              <a:ext uri="{FF2B5EF4-FFF2-40B4-BE49-F238E27FC236}">
+                <a16:creationId xmlns:a16="http://schemas.microsoft.com/office/drawing/2014/main" id="{73E61296-D2A2-4D7A-A859-38C48AE06C04}"/>
+              </a:ext>
+            </a:extLst>
+          </p:cNvPr>
+          <p:cNvSpPr>
+            <a:spLocks noGrp="1"/>
+          </p:cNvSpPr>
+          <p:nvPr>
+            <p:ph type="ftr" sz="quarter" idx="11"/>
+          </p:nvPr>
+        </p:nvSpPr>
+        <p:spPr/>
+        <p:txBody>
+          <a:bodyPr/>
+          <a:lstStyle/>
+          <a:p>
+            <a:r>
+              <a:rPr lang="en-US"/>
+              <a:t>houseprice-project.herokuapp.com</a:t>
+            </a:r>
+            <a:endParaRPr lang="en-US" dirty="0"/>
+          </a:p>
+        </p:txBody>
+      </p:sp>
+      <p:pic>
+        <p:nvPicPr>
+          <p:cNvPr id="5" name="Picture 4">
+            <a:extLst>
+              <a:ext uri="{FF2B5EF4-FFF2-40B4-BE49-F238E27FC236}">
+                <a16:creationId xmlns:a16="http://schemas.microsoft.com/office/drawing/2014/main" id="{5DE6FBE7-FE7E-4649-B2A4-48F14FE391AD}"/>
+              </a:ext>
+            </a:extLst>
+          </p:cNvPr>
+          <p:cNvPicPr>
+            <a:picLocks noChangeAspect="1"/>
+          </p:cNvPicPr>
+          <p:nvPr/>
+        </p:nvPicPr>
+        <p:blipFill>
+          <a:blip r:embed="rId3"/>
+          <a:stretch>
+            <a:fillRect/>
+          </a:stretch>
+        </p:blipFill>
+        <p:spPr>
+          <a:xfrm>
+            <a:off x="2116455" y="3002067"/>
+            <a:ext cx="4010025" cy="2867025"/>
+          </a:xfrm>
+          <a:prstGeom prst="rect">
+            <a:avLst/>
+          </a:prstGeom>
+        </p:spPr>
+      </p:pic>
+      <p:pic>
+        <p:nvPicPr>
+          <p:cNvPr id="10" name="Picture 9">
+            <a:extLst>
+              <a:ext uri="{FF2B5EF4-FFF2-40B4-BE49-F238E27FC236}">
+                <a16:creationId xmlns:a16="http://schemas.microsoft.com/office/drawing/2014/main" id="{B3A16DA2-0060-4318-8682-F306AD8911BC}"/>
+              </a:ext>
+            </a:extLst>
+          </p:cNvPr>
+          <p:cNvPicPr>
+            <a:picLocks noChangeAspect="1"/>
+          </p:cNvPicPr>
+          <p:nvPr/>
+        </p:nvPicPr>
+        <p:blipFill>
+          <a:blip r:embed="rId4"/>
+          <a:stretch>
+            <a:fillRect/>
+          </a:stretch>
+        </p:blipFill>
+        <p:spPr>
+          <a:xfrm>
+            <a:off x="7078980" y="3593358"/>
+            <a:ext cx="3124200" cy="790575"/>
+          </a:xfrm>
+          <a:prstGeom prst="rect">
+            <a:avLst/>
+          </a:prstGeom>
+        </p:spPr>
+      </p:pic>
+      <p:pic>
+        <p:nvPicPr>
+          <p:cNvPr id="11" name="Picture 4">
+            <a:extLst>
+              <a:ext uri="{FF2B5EF4-FFF2-40B4-BE49-F238E27FC236}">
+                <a16:creationId xmlns:a16="http://schemas.microsoft.com/office/drawing/2014/main" id="{EBAF3B5F-8C15-485A-B953-50542AFE2926}"/>
+              </a:ext>
+            </a:extLst>
+          </p:cNvPr>
+          <p:cNvPicPr>
+            <a:picLocks noChangeAspect="1" noChangeArrowheads="1"/>
+          </p:cNvPicPr>
+          <p:nvPr/>
+        </p:nvPicPr>
+        <p:blipFill>
+          <a:blip r:embed="rId5">
+            <a:extLst>
+              <a:ext uri="{28A0092B-C50C-407E-A947-70E740481C1C}">
+                <a14:useLocalDpi xmlns:a14="http://schemas.microsoft.com/office/drawing/2010/main" val="0"/>
+              </a:ext>
+            </a:extLst>
+          </a:blip>
+          <a:srcRect/>
+          <a:stretch>
+            <a:fillRect/>
+          </a:stretch>
+        </p:blipFill>
+        <p:spPr bwMode="auto">
+          <a:xfrm>
+            <a:off x="0" y="5268453"/>
+            <a:ext cx="1696306" cy="1128815"/>
+          </a:xfrm>
+          <a:prstGeom prst="rect">
+            <a:avLst/>
+          </a:prstGeom>
+          <a:noFill/>
+          <a:extLst>
+            <a:ext uri="{909E8E84-426E-40DD-AFC4-6F175D3DCCD1}">
+              <a14:hiddenFill xmlns:a14="http://schemas.microsoft.com/office/drawing/2010/main">
+                <a:solidFill>
+                  <a:srgbClr val="FFFFFF"/>
+                </a:solidFill>
+              </a14:hiddenFill>
+            </a:ext>
+          </a:extLst>
+        </p:spPr>
+      </p:pic>
+    </p:spTree>
+    <p:extLst>
+      <p:ext uri="{BB962C8B-B14F-4D97-AF65-F5344CB8AC3E}">
+        <p14:creationId xmlns:p14="http://schemas.microsoft.com/office/powerpoint/2010/main" val="2405747641"/>
+      </p:ext>
+    </p:extLst>
+  </p:cSld>
+  <p:clrMapOvr>
+    <a:masterClrMapping/>
+  </p:clrMapOvr>
+  <p:timing>
+    <p:tnLst>
+      <p:par>
+        <p:cTn id="1" dur="indefinite" restart="never" nodeType="tmRoot">
+          <p:childTnLst>
+            <p:seq concurrent="1" nextAc="seek">
+              <p:cTn id="2" dur="indefinite" nodeType="mainSeq">
+                <p:childTnLst>
+                  <p:par>
+                    <p:cTn id="3" fill="hold">
+                      <p:stCondLst>
+                        <p:cond delay="indefinite"/>
+                      </p:stCondLst>
+                      <p:childTnLst>
+                        <p:par>
+                          <p:cTn id="4" fill="hold">
+                            <p:stCondLst>
+                              <p:cond delay="0"/>
+                            </p:stCondLst>
+                            <p:childTnLst>
+                              <p:par>
+                                <p:cTn id="5" presetID="2" presetClass="entr" presetSubtype="2" fill="hold" nodeType="clickEffect">
+                                  <p:stCondLst>
+                                    <p:cond delay="0"/>
+                                  </p:stCondLst>
+                                  <p:childTnLst>
+                                    <p:set>
+                                      <p:cBhvr>
+                                        <p:cTn id="6" dur="1" fill="hold">
+                                          <p:stCondLst>
+                                            <p:cond delay="0"/>
+                                          </p:stCondLst>
+                                        </p:cTn>
+                                        <p:tgtEl>
+                                          <p:spTgt spid="11"/>
+                                        </p:tgtEl>
+                                        <p:attrNameLst>
+                                          <p:attrName>style.visibility</p:attrName>
+                                        </p:attrNameLst>
+                                      </p:cBhvr>
+                                      <p:to>
+                                        <p:strVal val="visible"/>
+                                      </p:to>
+                                    </p:set>
+                                    <p:anim calcmode="lin" valueType="num">
+                                      <p:cBhvr additive="base">
+                                        <p:cTn id="7" dur="3500" fill="hold"/>
+                                        <p:tgtEl>
+                                          <p:spTgt spid="11"/>
+                                        </p:tgtEl>
+                                        <p:attrNameLst>
+                                          <p:attrName>ppt_x</p:attrName>
+                                        </p:attrNameLst>
+                                      </p:cBhvr>
+                                      <p:tavLst>
+                                        <p:tav tm="0">
+                                          <p:val>
+                                            <p:strVal val="1+#ppt_w/2"/>
+                                          </p:val>
+                                        </p:tav>
+                                        <p:tav tm="100000">
+                                          <p:val>
+                                            <p:strVal val="#ppt_x"/>
+                                          </p:val>
+                                        </p:tav>
+                                      </p:tavLst>
+                                    </p:anim>
+                                    <p:anim calcmode="lin" valueType="num">
+                                      <p:cBhvr additive="base">
+                                        <p:cTn id="8" dur="3500" fill="hold"/>
+                                        <p:tgtEl>
+                                          <p:spTgt spid="11"/>
+                                        </p:tgtEl>
+                                        <p:attrNameLst>
+                                          <p:attrName>ppt_y</p:attrName>
+                                        </p:attrNameLst>
+                                      </p:cBhvr>
+                                      <p:tavLst>
+                                        <p:tav tm="0">
+                                          <p:val>
+                                            <p:strVal val="#ppt_y"/>
+                                          </p:val>
+                                        </p:tav>
+                                        <p:tav tm="100000">
+                                          <p:val>
+                                            <p:strVal val="#ppt_y"/>
+                                          </p:val>
+                                        </p:tav>
+                                      </p:tavLst>
+                                    </p:anim>
+                                  </p:childTnLst>
+                                </p:cTn>
+                              </p:par>
+                            </p:childTnLst>
+                          </p:cTn>
+                        </p:par>
+                      </p:childTnLst>
+                    </p:cTn>
+                  </p:par>
+                </p:childTnLst>
+              </p:cTn>
+              <p:prevCondLst>
+                <p:cond evt="onPrev" delay="0">
+                  <p:tgtEl>
+                    <p:sldTgt/>
+                  </p:tgtEl>
+                </p:cond>
+              </p:prevCondLst>
+              <p:nextCondLst>
+                <p:cond evt="onNext" delay="0">
+                  <p:tgtEl>
+                    <p:sldTgt/>
+                  </p:tgtEl>
+                </p:cond>
+              </p:nextCondLst>
+            </p:seq>
+          </p:childTnLst>
+        </p:cTn>
+      </p:par>
+    </p:tnLst>
+  </p:timing>
+</p:sld>
+</file>
+
+<file path=ppt/slides/slide13.xml><?xml version="1.0" encoding="utf-8"?>
+<p:sld xmlns:a="http://schemas.openxmlformats.org/drawingml/2006/main" xmlns:r="http://schemas.openxmlformats.org/officeDocument/2006/relationships" xmlns:p="http://schemas.openxmlformats.org/presentationml/2006/main">
+  <p:cSld>
+    <p:spTree>
+      <p:nvGrpSpPr>
+        <p:cNvPr id="1" name=""/>
+        <p:cNvGrpSpPr/>
+        <p:nvPr/>
+      </p:nvGrpSpPr>
+      <p:grpSpPr>
+        <a:xfrm>
+          <a:off x="0" y="0"/>
+          <a:ext cx="0" cy="0"/>
+          <a:chOff x="0" y="0"/>
+          <a:chExt cx="0" cy="0"/>
+        </a:xfrm>
+      </p:grpSpPr>
+      <p:sp>
+        <p:nvSpPr>
+          <p:cNvPr id="2" name="Title 1">
+            <a:extLst>
+              <a:ext uri="{FF2B5EF4-FFF2-40B4-BE49-F238E27FC236}">
+                <a16:creationId xmlns:a16="http://schemas.microsoft.com/office/drawing/2014/main" id="{19FA2153-3168-4605-B8BD-7EE4E3EACE78}"/>
+              </a:ext>
+            </a:extLst>
+          </p:cNvPr>
+          <p:cNvSpPr>
+            <a:spLocks noGrp="1"/>
+          </p:cNvSpPr>
+          <p:nvPr>
+            <p:ph type="title"/>
+          </p:nvPr>
+        </p:nvSpPr>
+        <p:spPr/>
+        <p:txBody>
+          <a:bodyPr/>
+          <a:lstStyle/>
+          <a:p>
+            <a:r>
+              <a:rPr lang="en-AU" dirty="0"/>
+              <a:t>Machine Learning</a:t>
+            </a:r>
+          </a:p>
+        </p:txBody>
+      </p:sp>
+      <p:sp>
+        <p:nvSpPr>
+          <p:cNvPr id="3" name="Content Placeholder 2">
+            <a:extLst>
+              <a:ext uri="{FF2B5EF4-FFF2-40B4-BE49-F238E27FC236}">
+                <a16:creationId xmlns:a16="http://schemas.microsoft.com/office/drawing/2014/main" id="{B00C9427-135D-430D-B9B9-A0112A48F98B}"/>
+              </a:ext>
+            </a:extLst>
+          </p:cNvPr>
+          <p:cNvSpPr>
+            <a:spLocks noGrp="1"/>
+          </p:cNvSpPr>
+          <p:nvPr>
+            <p:ph idx="1"/>
+          </p:nvPr>
+        </p:nvSpPr>
+        <p:spPr/>
+        <p:txBody>
+          <a:bodyPr/>
+          <a:lstStyle/>
+          <a:p>
+            <a:pPr>
+              <a:buFont typeface="Arial" panose="020B0604020202020204" pitchFamily="34" charset="0"/>
+              <a:buChar char="•"/>
+            </a:pPr>
+            <a:r>
+              <a:rPr lang="en-AU" dirty="0"/>
+              <a:t>Stuck </a:t>
+            </a:r>
+            <a:r>
+              <a:rPr lang="en-AU" dirty="0">
+                <a:sym typeface="Wingdings" panose="05000000000000000000" pitchFamily="2" charset="2"/>
+              </a:rPr>
+              <a:t></a:t>
+            </a:r>
+            <a:endParaRPr lang="en-AU" dirty="0"/>
+          </a:p>
+        </p:txBody>
+      </p:sp>
+      <p:sp>
+        <p:nvSpPr>
+          <p:cNvPr id="4" name="Footer Placeholder 3">
+            <a:extLst>
+              <a:ext uri="{FF2B5EF4-FFF2-40B4-BE49-F238E27FC236}">
+                <a16:creationId xmlns:a16="http://schemas.microsoft.com/office/drawing/2014/main" id="{73E61296-D2A2-4D7A-A859-38C48AE06C04}"/>
+              </a:ext>
+            </a:extLst>
+          </p:cNvPr>
+          <p:cNvSpPr>
+            <a:spLocks noGrp="1"/>
+          </p:cNvSpPr>
+          <p:nvPr>
+            <p:ph type="ftr" sz="quarter" idx="11"/>
+          </p:nvPr>
+        </p:nvSpPr>
+        <p:spPr/>
+        <p:txBody>
+          <a:bodyPr/>
+          <a:lstStyle/>
+          <a:p>
+            <a:r>
+              <a:rPr lang="en-US"/>
+              <a:t>houseprice-project.herokuapp.com</a:t>
+            </a:r>
+            <a:endParaRPr lang="en-US" dirty="0"/>
+          </a:p>
+        </p:txBody>
+      </p:sp>
+      <p:pic>
+        <p:nvPicPr>
+          <p:cNvPr id="9" name="Picture 8">
+            <a:extLst>
+              <a:ext uri="{FF2B5EF4-FFF2-40B4-BE49-F238E27FC236}">
+                <a16:creationId xmlns:a16="http://schemas.microsoft.com/office/drawing/2014/main" id="{E6288285-E886-43F2-8A32-319EF1369814}"/>
+              </a:ext>
+            </a:extLst>
+          </p:cNvPr>
+          <p:cNvPicPr>
+            <a:picLocks noChangeAspect="1"/>
+          </p:cNvPicPr>
+          <p:nvPr/>
+        </p:nvPicPr>
+        <p:blipFill>
+          <a:blip r:embed="rId3"/>
+          <a:stretch>
+            <a:fillRect/>
+          </a:stretch>
+        </p:blipFill>
+        <p:spPr>
+          <a:xfrm>
+            <a:off x="3825223" y="2437534"/>
+            <a:ext cx="4541554" cy="1982932"/>
+          </a:xfrm>
+          <a:prstGeom prst="rect">
+            <a:avLst/>
+          </a:prstGeom>
+        </p:spPr>
+      </p:pic>
+    </p:spTree>
+    <p:extLst>
+      <p:ext uri="{BB962C8B-B14F-4D97-AF65-F5344CB8AC3E}">
+        <p14:creationId xmlns:p14="http://schemas.microsoft.com/office/powerpoint/2010/main" val="3308554456"/>
+      </p:ext>
+    </p:extLst>
+  </p:cSld>
+  <p:clrMapOvr>
+    <a:masterClrMapping/>
+  </p:clrMapOvr>
+</p:sld>
+</file>
+
+<file path=ppt/slides/slide14.xml><?xml version="1.0" encoding="utf-8"?>
+<p:sld xmlns:a="http://schemas.openxmlformats.org/drawingml/2006/main" xmlns:r="http://schemas.openxmlformats.org/officeDocument/2006/relationships" xmlns:p="http://schemas.openxmlformats.org/presentationml/2006/main">
+  <p:cSld>
+    <p:spTree>
+      <p:nvGrpSpPr>
+        <p:cNvPr id="1" name=""/>
+        <p:cNvGrpSpPr/>
+        <p:nvPr/>
+      </p:nvGrpSpPr>
+      <p:grpSpPr>
+        <a:xfrm>
+          <a:off x="0" y="0"/>
+          <a:ext cx="0" cy="0"/>
+          <a:chOff x="0" y="0"/>
+          <a:chExt cx="0" cy="0"/>
+        </a:xfrm>
+      </p:grpSpPr>
+      <p:sp>
+        <p:nvSpPr>
+          <p:cNvPr id="2" name="Title 1">
+            <a:extLst>
+              <a:ext uri="{FF2B5EF4-FFF2-40B4-BE49-F238E27FC236}">
+                <a16:creationId xmlns:a16="http://schemas.microsoft.com/office/drawing/2014/main" id="{19FA2153-3168-4605-B8BD-7EE4E3EACE78}"/>
+              </a:ext>
+            </a:extLst>
+          </p:cNvPr>
+          <p:cNvSpPr>
+            <a:spLocks noGrp="1"/>
+          </p:cNvSpPr>
+          <p:nvPr>
+            <p:ph type="title"/>
+          </p:nvPr>
+        </p:nvSpPr>
+        <p:spPr/>
+        <p:txBody>
+          <a:bodyPr/>
+          <a:lstStyle/>
+          <a:p>
+            <a:r>
+              <a:rPr lang="en-AU" dirty="0"/>
+              <a:t>Machine Learning</a:t>
+            </a:r>
+          </a:p>
+        </p:txBody>
+      </p:sp>
+      <p:sp>
+        <p:nvSpPr>
+          <p:cNvPr id="3" name="Content Placeholder 2">
+            <a:extLst>
+              <a:ext uri="{FF2B5EF4-FFF2-40B4-BE49-F238E27FC236}">
+                <a16:creationId xmlns:a16="http://schemas.microsoft.com/office/drawing/2014/main" id="{B00C9427-135D-430D-B9B9-A0112A48F98B}"/>
+              </a:ext>
+            </a:extLst>
+          </p:cNvPr>
+          <p:cNvSpPr>
+            <a:spLocks noGrp="1"/>
+          </p:cNvSpPr>
+          <p:nvPr>
+            <p:ph idx="1"/>
+          </p:nvPr>
+        </p:nvSpPr>
+        <p:spPr/>
+        <p:txBody>
+          <a:bodyPr/>
+          <a:lstStyle/>
+          <a:p>
+            <a:pPr>
+              <a:buFont typeface="Arial" panose="020B0604020202020204" pitchFamily="34" charset="0"/>
+              <a:buChar char="•"/>
+            </a:pPr>
+            <a:r>
+              <a:rPr lang="en-AU" dirty="0"/>
+              <a:t>Progress!</a:t>
+            </a:r>
+          </a:p>
+        </p:txBody>
+      </p:sp>
+      <p:sp>
+        <p:nvSpPr>
+          <p:cNvPr id="4" name="Footer Placeholder 3">
+            <a:extLst>
+              <a:ext uri="{FF2B5EF4-FFF2-40B4-BE49-F238E27FC236}">
+                <a16:creationId xmlns:a16="http://schemas.microsoft.com/office/drawing/2014/main" id="{73E61296-D2A2-4D7A-A859-38C48AE06C04}"/>
+              </a:ext>
+            </a:extLst>
+          </p:cNvPr>
+          <p:cNvSpPr>
+            <a:spLocks noGrp="1"/>
+          </p:cNvSpPr>
+          <p:nvPr>
+            <p:ph type="ftr" sz="quarter" idx="11"/>
+          </p:nvPr>
+        </p:nvSpPr>
+        <p:spPr/>
+        <p:txBody>
+          <a:bodyPr/>
+          <a:lstStyle/>
+          <a:p>
+            <a:r>
+              <a:rPr lang="en-US"/>
+              <a:t>houseprice-project.herokuapp.com</a:t>
+            </a:r>
+            <a:endParaRPr lang="en-US" dirty="0"/>
+          </a:p>
+        </p:txBody>
+      </p:sp>
+      <p:pic>
+        <p:nvPicPr>
+          <p:cNvPr id="5" name="Picture 4">
+            <a:extLst>
+              <a:ext uri="{FF2B5EF4-FFF2-40B4-BE49-F238E27FC236}">
+                <a16:creationId xmlns:a16="http://schemas.microsoft.com/office/drawing/2014/main" id="{1DD9AC36-488B-4991-ABCA-BF0C68C2D1B6}"/>
+              </a:ext>
+            </a:extLst>
+          </p:cNvPr>
+          <p:cNvPicPr>
+            <a:picLocks noChangeAspect="1"/>
+          </p:cNvPicPr>
+          <p:nvPr/>
+        </p:nvPicPr>
+        <p:blipFill>
+          <a:blip r:embed="rId3"/>
+          <a:stretch>
+            <a:fillRect/>
+          </a:stretch>
+        </p:blipFill>
+        <p:spPr>
+          <a:xfrm>
+            <a:off x="3902306" y="2530759"/>
+            <a:ext cx="2409825" cy="2409825"/>
+          </a:xfrm>
+          <a:prstGeom prst="rect">
+            <a:avLst/>
+          </a:prstGeom>
+        </p:spPr>
+      </p:pic>
+      <p:pic>
+        <p:nvPicPr>
+          <p:cNvPr id="3074" name="Picture 2">
+            <a:extLst>
+              <a:ext uri="{FF2B5EF4-FFF2-40B4-BE49-F238E27FC236}">
+                <a16:creationId xmlns:a16="http://schemas.microsoft.com/office/drawing/2014/main" id="{98C185D0-FD97-4A70-B969-C8BE65F02F82}"/>
+              </a:ext>
+            </a:extLst>
+          </p:cNvPr>
+          <p:cNvPicPr>
+            <a:picLocks noChangeAspect="1" noChangeArrowheads="1"/>
+          </p:cNvPicPr>
+          <p:nvPr/>
+        </p:nvPicPr>
+        <p:blipFill>
+          <a:blip r:embed="rId4">
+            <a:extLst>
+              <a:ext uri="{28A0092B-C50C-407E-A947-70E740481C1C}">
+                <a14:useLocalDpi xmlns:a14="http://schemas.microsoft.com/office/drawing/2010/main" val="0"/>
+              </a:ext>
+            </a:extLst>
+          </a:blip>
+          <a:srcRect/>
+          <a:stretch>
+            <a:fillRect/>
+          </a:stretch>
+        </p:blipFill>
+        <p:spPr bwMode="auto">
+          <a:xfrm>
+            <a:off x="0" y="3740726"/>
+            <a:ext cx="2793877" cy="2706111"/>
+          </a:xfrm>
+          <a:prstGeom prst="rect">
+            <a:avLst/>
+          </a:prstGeom>
+          <a:noFill/>
+          <a:extLst>
+            <a:ext uri="{909E8E84-426E-40DD-AFC4-6F175D3DCCD1}">
+              <a14:hiddenFill xmlns:a14="http://schemas.microsoft.com/office/drawing/2010/main">
+                <a:solidFill>
+                  <a:srgbClr val="FFFFFF"/>
+                </a:solidFill>
+              </a14:hiddenFill>
+            </a:ext>
+          </a:extLst>
+        </p:spPr>
+      </p:pic>
+    </p:spTree>
+    <p:extLst>
+      <p:ext uri="{BB962C8B-B14F-4D97-AF65-F5344CB8AC3E}">
+        <p14:creationId xmlns:p14="http://schemas.microsoft.com/office/powerpoint/2010/main" val="3798789170"/>
+      </p:ext>
+    </p:extLst>
+  </p:cSld>
+  <p:clrMapOvr>
+    <a:masterClrMapping/>
+  </p:clrMapOvr>
+  <p:timing>
+    <p:tnLst>
+      <p:par>
+        <p:cTn id="1" dur="indefinite" restart="never" nodeType="tmRoot">
+          <p:childTnLst>
+            <p:seq concurrent="1" nextAc="seek">
+              <p:cTn id="2" dur="indefinite" nodeType="mainSeq">
+                <p:childTnLst>
+                  <p:par>
+                    <p:cTn id="3" fill="hold">
+                      <p:stCondLst>
+                        <p:cond delay="indefinite"/>
+                      </p:stCondLst>
+                      <p:childTnLst>
+                        <p:par>
+                          <p:cTn id="4" fill="hold">
+                            <p:stCondLst>
+                              <p:cond delay="0"/>
+                            </p:stCondLst>
+                            <p:childTnLst>
+                              <p:par>
+                                <p:cTn id="5" presetID="42" presetClass="entr" presetSubtype="0" fill="hold" nodeType="clickEffect">
+                                  <p:stCondLst>
+                                    <p:cond delay="0"/>
+                                  </p:stCondLst>
+                                  <p:childTnLst>
+                                    <p:set>
+                                      <p:cBhvr>
+                                        <p:cTn id="6" dur="1" fill="hold">
+                                          <p:stCondLst>
+                                            <p:cond delay="0"/>
+                                          </p:stCondLst>
+                                        </p:cTn>
+                                        <p:tgtEl>
+                                          <p:spTgt spid="3074"/>
+                                        </p:tgtEl>
+                                        <p:attrNameLst>
+                                          <p:attrName>style.visibility</p:attrName>
+                                        </p:attrNameLst>
+                                      </p:cBhvr>
+                                      <p:to>
+                                        <p:strVal val="visible"/>
+                                      </p:to>
+                                    </p:set>
+                                    <p:animEffect transition="in" filter="fade">
+                                      <p:cBhvr>
+                                        <p:cTn id="7" dur="1000"/>
+                                        <p:tgtEl>
+                                          <p:spTgt spid="3074"/>
+                                        </p:tgtEl>
+                                      </p:cBhvr>
+                                    </p:animEffect>
+                                    <p:anim calcmode="lin" valueType="num">
+                                      <p:cBhvr>
+                                        <p:cTn id="8" dur="1000" fill="hold"/>
+                                        <p:tgtEl>
+                                          <p:spTgt spid="3074"/>
+                                        </p:tgtEl>
+                                        <p:attrNameLst>
+                                          <p:attrName>ppt_x</p:attrName>
+                                        </p:attrNameLst>
+                                      </p:cBhvr>
+                                      <p:tavLst>
+                                        <p:tav tm="0">
+                                          <p:val>
+                                            <p:strVal val="#ppt_x"/>
+                                          </p:val>
+                                        </p:tav>
+                                        <p:tav tm="100000">
+                                          <p:val>
+                                            <p:strVal val="#ppt_x"/>
+                                          </p:val>
+                                        </p:tav>
+                                      </p:tavLst>
+                                    </p:anim>
+                                    <p:anim calcmode="lin" valueType="num">
+                                      <p:cBhvr>
+                                        <p:cTn id="9" dur="1000" fill="hold"/>
+                                        <p:tgtEl>
+                                          <p:spTgt spid="3074"/>
+                                        </p:tgtEl>
+                                        <p:attrNameLst>
+                                          <p:attrName>ppt_y</p:attrName>
+                                        </p:attrNameLst>
+                                      </p:cBhvr>
+                                      <p:tavLst>
+                                        <p:tav tm="0">
+                                          <p:val>
+                                            <p:strVal val="#ppt_y+.1"/>
+                                          </p:val>
+                                        </p:tav>
+                                        <p:tav tm="100000">
+                                          <p:val>
+                                            <p:strVal val="#ppt_y"/>
+                                          </p:val>
+                                        </p:tav>
+                                      </p:tavLst>
+                                    </p:anim>
+                                  </p:childTnLst>
+                                </p:cTn>
+                              </p:par>
+                            </p:childTnLst>
+                          </p:cTn>
+                        </p:par>
+                        <p:par>
+                          <p:cTn id="10" fill="hold">
+                            <p:stCondLst>
+                              <p:cond delay="1000"/>
+                            </p:stCondLst>
+                            <p:childTnLst>
+                              <p:par>
+                                <p:cTn id="11" presetID="32" presetClass="emph" presetSubtype="0" fill="hold" nodeType="afterEffect">
+                                  <p:stCondLst>
+                                    <p:cond delay="0"/>
+                                  </p:stCondLst>
+                                  <p:childTnLst>
+                                    <p:animRot by="120000">
+                                      <p:cBhvr>
+                                        <p:cTn id="12" dur="100" fill="hold">
+                                          <p:stCondLst>
+                                            <p:cond delay="0"/>
+                                          </p:stCondLst>
+                                        </p:cTn>
+                                        <p:tgtEl>
+                                          <p:spTgt spid="3074"/>
+                                        </p:tgtEl>
+                                        <p:attrNameLst>
+                                          <p:attrName>r</p:attrName>
+                                        </p:attrNameLst>
+                                      </p:cBhvr>
+                                    </p:animRot>
+                                    <p:animRot by="-240000">
+                                      <p:cBhvr>
+                                        <p:cTn id="13" dur="200" fill="hold">
+                                          <p:stCondLst>
+                                            <p:cond delay="200"/>
+                                          </p:stCondLst>
+                                        </p:cTn>
+                                        <p:tgtEl>
+                                          <p:spTgt spid="3074"/>
+                                        </p:tgtEl>
+                                        <p:attrNameLst>
+                                          <p:attrName>r</p:attrName>
+                                        </p:attrNameLst>
+                                      </p:cBhvr>
+                                    </p:animRot>
+                                    <p:animRot by="240000">
+                                      <p:cBhvr>
+                                        <p:cTn id="14" dur="200" fill="hold">
+                                          <p:stCondLst>
+                                            <p:cond delay="400"/>
+                                          </p:stCondLst>
+                                        </p:cTn>
+                                        <p:tgtEl>
+                                          <p:spTgt spid="3074"/>
+                                        </p:tgtEl>
+                                        <p:attrNameLst>
+                                          <p:attrName>r</p:attrName>
+                                        </p:attrNameLst>
+                                      </p:cBhvr>
+                                    </p:animRot>
+                                    <p:animRot by="-240000">
+                                      <p:cBhvr>
+                                        <p:cTn id="15" dur="200" fill="hold">
+                                          <p:stCondLst>
+                                            <p:cond delay="600"/>
+                                          </p:stCondLst>
+                                        </p:cTn>
+                                        <p:tgtEl>
+                                          <p:spTgt spid="3074"/>
+                                        </p:tgtEl>
+                                        <p:attrNameLst>
+                                          <p:attrName>r</p:attrName>
+                                        </p:attrNameLst>
+                                      </p:cBhvr>
+                                    </p:animRot>
+                                    <p:animRot by="120000">
+                                      <p:cBhvr>
+                                        <p:cTn id="16" dur="200" fill="hold">
+                                          <p:stCondLst>
+                                            <p:cond delay="800"/>
+                                          </p:stCondLst>
+                                        </p:cTn>
+                                        <p:tgtEl>
+                                          <p:spTgt spid="3074"/>
+                                        </p:tgtEl>
+                                        <p:attrNameLst>
+                                          <p:attrName>r</p:attrName>
+                                        </p:attrNameLst>
+                                      </p:cBhvr>
+                                    </p:animRot>
+                                  </p:childTnLst>
+                                </p:cTn>
+                              </p:par>
+                            </p:childTnLst>
+                          </p:cTn>
+                        </p:par>
+                      </p:childTnLst>
+                    </p:cTn>
+                  </p:par>
+                </p:childTnLst>
+              </p:cTn>
+              <p:prevCondLst>
+                <p:cond evt="onPrev" delay="0">
+                  <p:tgtEl>
+                    <p:sldTgt/>
+                  </p:tgtEl>
+                </p:cond>
+              </p:prevCondLst>
+              <p:nextCondLst>
+                <p:cond evt="onNext" delay="0">
+                  <p:tgtEl>
+                    <p:sldTgt/>
+                  </p:tgtEl>
+                </p:cond>
+              </p:nextCondLst>
+            </p:seq>
+          </p:childTnLst>
+        </p:cTn>
+      </p:par>
+    </p:tnLst>
+  </p:timing>
+</p:sld>
+</file>
+
+<file path=ppt/slides/slide15.xml><?xml version="1.0" encoding="utf-8"?>
+<p:sld xmlns:a="http://schemas.openxmlformats.org/drawingml/2006/main" xmlns:r="http://schemas.openxmlformats.org/officeDocument/2006/relationships" xmlns:p="http://schemas.openxmlformats.org/presentationml/2006/main">
+  <p:cSld>
+    <p:spTree>
+      <p:nvGrpSpPr>
+        <p:cNvPr id="1" name=""/>
+        <p:cNvGrpSpPr/>
+        <p:nvPr/>
+      </p:nvGrpSpPr>
+      <p:grpSpPr>
+        <a:xfrm>
+          <a:off x="0" y="0"/>
+          <a:ext cx="0" cy="0"/>
+          <a:chOff x="0" y="0"/>
+          <a:chExt cx="0" cy="0"/>
+        </a:xfrm>
+      </p:grpSpPr>
+      <p:sp>
+        <p:nvSpPr>
+          <p:cNvPr id="2" name="Title 1">
+            <a:extLst>
+              <a:ext uri="{FF2B5EF4-FFF2-40B4-BE49-F238E27FC236}">
+                <a16:creationId xmlns:a16="http://schemas.microsoft.com/office/drawing/2014/main" id="{19FA2153-3168-4605-B8BD-7EE4E3EACE78}"/>
+              </a:ext>
+            </a:extLst>
+          </p:cNvPr>
+          <p:cNvSpPr>
+            <a:spLocks noGrp="1"/>
+          </p:cNvSpPr>
+          <p:nvPr>
+            <p:ph type="title"/>
+          </p:nvPr>
+        </p:nvSpPr>
+        <p:spPr/>
+        <p:txBody>
+          <a:bodyPr/>
+          <a:lstStyle/>
+          <a:p>
+            <a:r>
+              <a:rPr lang="en-AU" dirty="0"/>
+              <a:t>Machine Learning</a:t>
+            </a:r>
+          </a:p>
+        </p:txBody>
+      </p:sp>
+      <p:sp>
+        <p:nvSpPr>
+          <p:cNvPr id="3" name="Content Placeholder 2">
+            <a:extLst>
+              <a:ext uri="{FF2B5EF4-FFF2-40B4-BE49-F238E27FC236}">
+                <a16:creationId xmlns:a16="http://schemas.microsoft.com/office/drawing/2014/main" id="{B00C9427-135D-430D-B9B9-A0112A48F98B}"/>
+              </a:ext>
+            </a:extLst>
+          </p:cNvPr>
+          <p:cNvSpPr>
+            <a:spLocks noGrp="1"/>
+          </p:cNvSpPr>
+          <p:nvPr>
+            <p:ph idx="1"/>
+          </p:nvPr>
+        </p:nvSpPr>
+        <p:spPr/>
+        <p:txBody>
+          <a:bodyPr/>
+          <a:lstStyle/>
+          <a:p>
+            <a:pPr>
+              <a:buFont typeface="Arial" panose="020B0604020202020204" pitchFamily="34" charset="0"/>
+              <a:buChar char="•"/>
+            </a:pPr>
+            <a:r>
+              <a:rPr lang="en-AU" dirty="0"/>
+              <a:t>Models work!</a:t>
+            </a:r>
+          </a:p>
+        </p:txBody>
+      </p:sp>
+      <p:sp>
+        <p:nvSpPr>
+          <p:cNvPr id="4" name="Footer Placeholder 3">
+            <a:extLst>
+              <a:ext uri="{FF2B5EF4-FFF2-40B4-BE49-F238E27FC236}">
+                <a16:creationId xmlns:a16="http://schemas.microsoft.com/office/drawing/2014/main" id="{73E61296-D2A2-4D7A-A859-38C48AE06C04}"/>
+              </a:ext>
+            </a:extLst>
+          </p:cNvPr>
+          <p:cNvSpPr>
+            <a:spLocks noGrp="1"/>
+          </p:cNvSpPr>
+          <p:nvPr>
+            <p:ph type="ftr" sz="quarter" idx="11"/>
+          </p:nvPr>
+        </p:nvSpPr>
+        <p:spPr/>
+        <p:txBody>
+          <a:bodyPr/>
+          <a:lstStyle/>
+          <a:p>
+            <a:r>
+              <a:rPr lang="en-US"/>
+              <a:t>houseprice-project.herokuapp.com</a:t>
+            </a:r>
+            <a:endParaRPr lang="en-US" dirty="0"/>
+          </a:p>
+        </p:txBody>
+      </p:sp>
+      <p:pic>
+        <p:nvPicPr>
+          <p:cNvPr id="2054" name="Picture 6">
+            <a:extLst>
+              <a:ext uri="{FF2B5EF4-FFF2-40B4-BE49-F238E27FC236}">
+                <a16:creationId xmlns:a16="http://schemas.microsoft.com/office/drawing/2014/main" id="{54E93C87-9AE2-41EA-9072-59CC20DF6D8C}"/>
+              </a:ext>
+            </a:extLst>
+          </p:cNvPr>
+          <p:cNvPicPr>
+            <a:picLocks noChangeAspect="1" noChangeArrowheads="1"/>
+          </p:cNvPicPr>
+          <p:nvPr/>
+        </p:nvPicPr>
+        <p:blipFill>
+          <a:blip r:embed="rId3">
+            <a:extLst>
+              <a:ext uri="{28A0092B-C50C-407E-A947-70E740481C1C}">
+                <a14:useLocalDpi xmlns:a14="http://schemas.microsoft.com/office/drawing/2010/main" val="0"/>
+              </a:ext>
+            </a:extLst>
+          </a:blip>
+          <a:srcRect/>
+          <a:stretch>
+            <a:fillRect/>
+          </a:stretch>
+        </p:blipFill>
+        <p:spPr bwMode="auto">
+          <a:xfrm>
+            <a:off x="8365698" y="3091116"/>
+            <a:ext cx="3312343" cy="2440092"/>
+          </a:xfrm>
+          <a:prstGeom prst="rect">
+            <a:avLst/>
+          </a:prstGeom>
+          <a:noFill/>
+          <a:extLst>
+            <a:ext uri="{909E8E84-426E-40DD-AFC4-6F175D3DCCD1}">
+              <a14:hiddenFill xmlns:a14="http://schemas.microsoft.com/office/drawing/2010/main">
+                <a:solidFill>
+                  <a:srgbClr val="FFFFFF"/>
+                </a:solidFill>
+              </a14:hiddenFill>
+            </a:ext>
+          </a:extLst>
+        </p:spPr>
+      </p:pic>
+      <p:pic>
+        <p:nvPicPr>
+          <p:cNvPr id="2056" name="Picture 8">
+            <a:extLst>
+              <a:ext uri="{FF2B5EF4-FFF2-40B4-BE49-F238E27FC236}">
+                <a16:creationId xmlns:a16="http://schemas.microsoft.com/office/drawing/2014/main" id="{CBFAAE72-D5F4-49D2-9972-3E1EFE3F8E8D}"/>
+              </a:ext>
+            </a:extLst>
+          </p:cNvPr>
+          <p:cNvPicPr>
+            <a:picLocks noChangeAspect="1" noChangeArrowheads="1"/>
+          </p:cNvPicPr>
+          <p:nvPr/>
+        </p:nvPicPr>
+        <p:blipFill>
+          <a:blip r:embed="rId4">
+            <a:extLst>
+              <a:ext uri="{28A0092B-C50C-407E-A947-70E740481C1C}">
+                <a14:useLocalDpi xmlns:a14="http://schemas.microsoft.com/office/drawing/2010/main" val="0"/>
+              </a:ext>
+            </a:extLst>
+          </a:blip>
+          <a:srcRect/>
+          <a:stretch>
+            <a:fillRect/>
+          </a:stretch>
+        </p:blipFill>
+        <p:spPr bwMode="auto">
+          <a:xfrm>
+            <a:off x="728425" y="3337856"/>
+            <a:ext cx="3158837" cy="1776846"/>
+          </a:xfrm>
+          <a:prstGeom prst="rect">
+            <a:avLst/>
+          </a:prstGeom>
+          <a:noFill/>
+          <a:extLst>
+            <a:ext uri="{909E8E84-426E-40DD-AFC4-6F175D3DCCD1}">
+              <a14:hiddenFill xmlns:a14="http://schemas.microsoft.com/office/drawing/2010/main">
+                <a:solidFill>
+                  <a:srgbClr val="FFFFFF"/>
+                </a:solidFill>
+              </a14:hiddenFill>
+            </a:ext>
+          </a:extLst>
+        </p:spPr>
+      </p:pic>
+      <p:pic>
+        <p:nvPicPr>
+          <p:cNvPr id="8" name="Picture 7">
+            <a:extLst>
+              <a:ext uri="{FF2B5EF4-FFF2-40B4-BE49-F238E27FC236}">
+                <a16:creationId xmlns:a16="http://schemas.microsoft.com/office/drawing/2014/main" id="{A88F33FB-290C-438B-9A79-25820D90FED0}"/>
+              </a:ext>
+            </a:extLst>
+          </p:cNvPr>
+          <p:cNvPicPr>
+            <a:picLocks noChangeAspect="1"/>
+          </p:cNvPicPr>
+          <p:nvPr/>
+        </p:nvPicPr>
+        <p:blipFill>
+          <a:blip r:embed="rId5"/>
+          <a:stretch>
+            <a:fillRect/>
+          </a:stretch>
+        </p:blipFill>
+        <p:spPr>
+          <a:xfrm>
+            <a:off x="4111380" y="2583467"/>
+            <a:ext cx="4030200" cy="3455390"/>
+          </a:xfrm>
+          <a:prstGeom prst="rect">
+            <a:avLst/>
+          </a:prstGeom>
+        </p:spPr>
+      </p:pic>
+    </p:spTree>
+    <p:extLst>
+      <p:ext uri="{BB962C8B-B14F-4D97-AF65-F5344CB8AC3E}">
+        <p14:creationId xmlns:p14="http://schemas.microsoft.com/office/powerpoint/2010/main" val="3783371132"/>
+      </p:ext>
+    </p:extLst>
+  </p:cSld>
+  <p:clrMapOvr>
+    <a:masterClrMapping/>
+  </p:clrMapOvr>
+</p:sld>
+</file>
+
+<file path=ppt/slides/slide16.xml><?xml version="1.0" encoding="utf-8"?>
+<p:sld xmlns:a="http://schemas.openxmlformats.org/drawingml/2006/main" xmlns:r="http://schemas.openxmlformats.org/officeDocument/2006/relationships" xmlns:p="http://schemas.openxmlformats.org/presentationml/2006/main">
+  <p:cSld>
+    <p:spTree>
+      <p:nvGrpSpPr>
+        <p:cNvPr id="1" name=""/>
+        <p:cNvGrpSpPr/>
+        <p:nvPr/>
+      </p:nvGrpSpPr>
+      <p:grpSpPr>
+        <a:xfrm>
+          <a:off x="0" y="0"/>
+          <a:ext cx="0" cy="0"/>
+          <a:chOff x="0" y="0"/>
+          <a:chExt cx="0" cy="0"/>
+        </a:xfrm>
+      </p:grpSpPr>
+      <p:sp>
+        <p:nvSpPr>
+          <p:cNvPr id="2" name="Title 1">
+            <a:extLst>
+              <a:ext uri="{FF2B5EF4-FFF2-40B4-BE49-F238E27FC236}">
+                <a16:creationId xmlns:a16="http://schemas.microsoft.com/office/drawing/2014/main" id="{19FA2153-3168-4605-B8BD-7EE4E3EACE78}"/>
+              </a:ext>
+            </a:extLst>
+          </p:cNvPr>
+          <p:cNvSpPr>
+            <a:spLocks noGrp="1"/>
+          </p:cNvSpPr>
+          <p:nvPr>
+            <p:ph type="title"/>
+          </p:nvPr>
+        </p:nvSpPr>
+        <p:spPr/>
+        <p:txBody>
+          <a:bodyPr/>
+          <a:lstStyle/>
+          <a:p>
+            <a:r>
+              <a:rPr lang="en-AU" dirty="0"/>
+              <a:t>Machine Learning</a:t>
+            </a:r>
+          </a:p>
+        </p:txBody>
+      </p:sp>
+      <p:sp>
+        <p:nvSpPr>
+          <p:cNvPr id="3" name="Content Placeholder 2">
+            <a:extLst>
+              <a:ext uri="{FF2B5EF4-FFF2-40B4-BE49-F238E27FC236}">
+                <a16:creationId xmlns:a16="http://schemas.microsoft.com/office/drawing/2014/main" id="{B00C9427-135D-430D-B9B9-A0112A48F98B}"/>
+              </a:ext>
+            </a:extLst>
+          </p:cNvPr>
+          <p:cNvSpPr>
+            <a:spLocks noGrp="1"/>
+          </p:cNvSpPr>
+          <p:nvPr>
+            <p:ph idx="1"/>
+          </p:nvPr>
+        </p:nvSpPr>
+        <p:spPr/>
+        <p:txBody>
+          <a:bodyPr/>
+          <a:lstStyle/>
+          <a:p>
+            <a:pPr>
+              <a:buFont typeface="Arial" panose="020B0604020202020204" pitchFamily="34" charset="0"/>
+              <a:buChar char="•"/>
+            </a:pPr>
+            <a:r>
+              <a:rPr lang="en-AU" dirty="0"/>
+              <a:t>Stuck </a:t>
+            </a:r>
+            <a:r>
+              <a:rPr lang="en-AU" dirty="0">
+                <a:sym typeface="Wingdings" panose="05000000000000000000" pitchFamily="2" charset="2"/>
+              </a:rPr>
+              <a:t></a:t>
+            </a:r>
+            <a:endParaRPr lang="en-AU" dirty="0"/>
+          </a:p>
+        </p:txBody>
+      </p:sp>
+      <p:sp>
+        <p:nvSpPr>
+          <p:cNvPr id="4" name="Footer Placeholder 3">
+            <a:extLst>
+              <a:ext uri="{FF2B5EF4-FFF2-40B4-BE49-F238E27FC236}">
+                <a16:creationId xmlns:a16="http://schemas.microsoft.com/office/drawing/2014/main" id="{73E61296-D2A2-4D7A-A859-38C48AE06C04}"/>
+              </a:ext>
+            </a:extLst>
+          </p:cNvPr>
+          <p:cNvSpPr>
+            <a:spLocks noGrp="1"/>
+          </p:cNvSpPr>
+          <p:nvPr>
+            <p:ph type="ftr" sz="quarter" idx="11"/>
+          </p:nvPr>
+        </p:nvSpPr>
+        <p:spPr/>
+        <p:txBody>
+          <a:bodyPr/>
+          <a:lstStyle/>
+          <a:p>
+            <a:r>
+              <a:rPr lang="en-US"/>
+              <a:t>houseprice-project.herokuapp.com</a:t>
+            </a:r>
+            <a:endParaRPr lang="en-US" dirty="0"/>
+          </a:p>
+        </p:txBody>
+      </p:sp>
+      <p:pic>
+        <p:nvPicPr>
+          <p:cNvPr id="6" name="Picture 5">
+            <a:extLst>
+              <a:ext uri="{FF2B5EF4-FFF2-40B4-BE49-F238E27FC236}">
+                <a16:creationId xmlns:a16="http://schemas.microsoft.com/office/drawing/2014/main" id="{405DCF01-2F08-45F9-BD8F-BB429B1A90CD}"/>
+              </a:ext>
+            </a:extLst>
+          </p:cNvPr>
+          <p:cNvPicPr>
+            <a:picLocks noChangeAspect="1"/>
+          </p:cNvPicPr>
+          <p:nvPr/>
+        </p:nvPicPr>
+        <p:blipFill>
+          <a:blip r:embed="rId3"/>
+          <a:stretch>
+            <a:fillRect/>
+          </a:stretch>
+        </p:blipFill>
+        <p:spPr>
+          <a:xfrm>
+            <a:off x="3351900" y="2476865"/>
+            <a:ext cx="5549159" cy="1904269"/>
+          </a:xfrm>
+          <a:prstGeom prst="rect">
+            <a:avLst/>
+          </a:prstGeom>
+        </p:spPr>
+      </p:pic>
+    </p:spTree>
+    <p:extLst>
+      <p:ext uri="{BB962C8B-B14F-4D97-AF65-F5344CB8AC3E}">
+        <p14:creationId xmlns:p14="http://schemas.microsoft.com/office/powerpoint/2010/main" val="3661510101"/>
+      </p:ext>
+    </p:extLst>
+  </p:cSld>
+  <p:clrMapOvr>
+    <a:masterClrMapping/>
+  </p:clrMapOvr>
+</p:sld>
+</file>
+
+<file path=ppt/slides/slide17.xml><?xml version="1.0" encoding="utf-8"?>
+<p:sld xmlns:a="http://schemas.openxmlformats.org/drawingml/2006/main" xmlns:r="http://schemas.openxmlformats.org/officeDocument/2006/relationships" xmlns:p="http://schemas.openxmlformats.org/presentationml/2006/main">
+  <p:cSld>
+    <p:spTree>
+      <p:nvGrpSpPr>
+        <p:cNvPr id="1" name=""/>
+        <p:cNvGrpSpPr/>
+        <p:nvPr/>
+      </p:nvGrpSpPr>
+      <p:grpSpPr>
+        <a:xfrm>
+          <a:off x="0" y="0"/>
+          <a:ext cx="0" cy="0"/>
+          <a:chOff x="0" y="0"/>
+          <a:chExt cx="0" cy="0"/>
+        </a:xfrm>
+      </p:grpSpPr>
+      <p:sp>
+        <p:nvSpPr>
+          <p:cNvPr id="2" name="Title 1">
+            <a:extLst>
+              <a:ext uri="{FF2B5EF4-FFF2-40B4-BE49-F238E27FC236}">
+                <a16:creationId xmlns:a16="http://schemas.microsoft.com/office/drawing/2014/main" id="{19FA2153-3168-4605-B8BD-7EE4E3EACE78}"/>
+              </a:ext>
+            </a:extLst>
+          </p:cNvPr>
+          <p:cNvSpPr>
+            <a:spLocks noGrp="1"/>
+          </p:cNvSpPr>
+          <p:nvPr>
+            <p:ph type="title"/>
+          </p:nvPr>
+        </p:nvSpPr>
+        <p:spPr/>
+        <p:txBody>
+          <a:bodyPr/>
+          <a:lstStyle/>
+          <a:p>
+            <a:r>
+              <a:rPr lang="en-AU" dirty="0"/>
+              <a:t>Machine Learning</a:t>
+            </a:r>
+          </a:p>
+        </p:txBody>
+      </p:sp>
+      <p:sp>
+        <p:nvSpPr>
+          <p:cNvPr id="3" name="Content Placeholder 2">
+            <a:extLst>
+              <a:ext uri="{FF2B5EF4-FFF2-40B4-BE49-F238E27FC236}">
+                <a16:creationId xmlns:a16="http://schemas.microsoft.com/office/drawing/2014/main" id="{B00C9427-135D-430D-B9B9-A0112A48F98B}"/>
+              </a:ext>
+            </a:extLst>
+          </p:cNvPr>
+          <p:cNvSpPr>
+            <a:spLocks noGrp="1"/>
+          </p:cNvSpPr>
+          <p:nvPr>
+            <p:ph idx="1"/>
+          </p:nvPr>
+        </p:nvSpPr>
+        <p:spPr/>
+        <p:txBody>
+          <a:bodyPr/>
+          <a:lstStyle/>
+          <a:p>
+            <a:pPr>
+              <a:buFont typeface="Arial" panose="020B0604020202020204" pitchFamily="34" charset="0"/>
+              <a:buChar char="•"/>
+            </a:pPr>
+            <a:r>
+              <a:rPr lang="en-AU" dirty="0"/>
+              <a:t>Stuck </a:t>
+            </a:r>
+            <a:r>
+              <a:rPr lang="en-AU" dirty="0">
+                <a:sym typeface="Wingdings" panose="05000000000000000000" pitchFamily="2" charset="2"/>
+              </a:rPr>
+              <a:t></a:t>
+            </a:r>
+            <a:endParaRPr lang="en-AU" dirty="0"/>
+          </a:p>
+        </p:txBody>
+      </p:sp>
+      <p:sp>
+        <p:nvSpPr>
+          <p:cNvPr id="4" name="Footer Placeholder 3">
+            <a:extLst>
+              <a:ext uri="{FF2B5EF4-FFF2-40B4-BE49-F238E27FC236}">
+                <a16:creationId xmlns:a16="http://schemas.microsoft.com/office/drawing/2014/main" id="{73E61296-D2A2-4D7A-A859-38C48AE06C04}"/>
+              </a:ext>
+            </a:extLst>
+          </p:cNvPr>
+          <p:cNvSpPr>
+            <a:spLocks noGrp="1"/>
+          </p:cNvSpPr>
+          <p:nvPr>
+            <p:ph type="ftr" sz="quarter" idx="11"/>
+          </p:nvPr>
+        </p:nvSpPr>
+        <p:spPr/>
+        <p:txBody>
+          <a:bodyPr/>
+          <a:lstStyle/>
+          <a:p>
+            <a:r>
+              <a:rPr lang="en-US"/>
+              <a:t>houseprice-project.herokuapp.com</a:t>
+            </a:r>
+            <a:endParaRPr lang="en-US" dirty="0"/>
+          </a:p>
+        </p:txBody>
+      </p:sp>
+      <p:pic>
+        <p:nvPicPr>
+          <p:cNvPr id="7" name="Picture 2">
+            <a:extLst>
+              <a:ext uri="{FF2B5EF4-FFF2-40B4-BE49-F238E27FC236}">
+                <a16:creationId xmlns:a16="http://schemas.microsoft.com/office/drawing/2014/main" id="{85A095BE-AB81-489E-8776-29EAA3AA54C9}"/>
+              </a:ext>
+            </a:extLst>
+          </p:cNvPr>
+          <p:cNvPicPr>
+            <a:picLocks noChangeAspect="1" noChangeArrowheads="1"/>
+          </p:cNvPicPr>
+          <p:nvPr/>
+        </p:nvPicPr>
+        <p:blipFill>
+          <a:blip r:embed="rId3">
+            <a:extLst>
+              <a:ext uri="{28A0092B-C50C-407E-A947-70E740481C1C}">
+                <a14:useLocalDpi xmlns:a14="http://schemas.microsoft.com/office/drawing/2010/main" val="0"/>
+              </a:ext>
+            </a:extLst>
+          </a:blip>
+          <a:srcRect/>
+          <a:stretch>
+            <a:fillRect/>
+          </a:stretch>
+        </p:blipFill>
+        <p:spPr bwMode="auto">
+          <a:xfrm>
+            <a:off x="3398433" y="2190268"/>
+            <a:ext cx="5395133" cy="3596755"/>
+          </a:xfrm>
+          <a:prstGeom prst="rect">
+            <a:avLst/>
+          </a:prstGeom>
+          <a:noFill/>
+          <a:extLst>
+            <a:ext uri="{909E8E84-426E-40DD-AFC4-6F175D3DCCD1}">
+              <a14:hiddenFill xmlns:a14="http://schemas.microsoft.com/office/drawing/2010/main">
+                <a:solidFill>
+                  <a:srgbClr val="FFFFFF"/>
+                </a:solidFill>
+              </a14:hiddenFill>
+            </a:ext>
+          </a:extLst>
+        </p:spPr>
+      </p:pic>
+    </p:spTree>
+    <p:extLst>
+      <p:ext uri="{BB962C8B-B14F-4D97-AF65-F5344CB8AC3E}">
+        <p14:creationId xmlns:p14="http://schemas.microsoft.com/office/powerpoint/2010/main" val="371009223"/>
+      </p:ext>
+    </p:extLst>
+  </p:cSld>
+  <p:clrMapOvr>
+    <a:masterClrMapping/>
+  </p:clrMapOvr>
+</p:sld>
+</file>
+
+<file path=ppt/slides/slide18.xml><?xml version="1.0" encoding="utf-8"?>
+<p:sld xmlns:a="http://schemas.openxmlformats.org/drawingml/2006/main" xmlns:r="http://schemas.openxmlformats.org/officeDocument/2006/relationships" xmlns:p="http://schemas.openxmlformats.org/presentationml/2006/main">
+  <p:cSld>
     <p:bg>
       <p:bgPr>
         <a:solidFill>
@@ -4657,12 +7336,12 @@
           <a:lstStyle/>
           <a:p>
             <a:r>
-              <a:rPr lang="en-US">
+              <a:rPr lang="en-US" dirty="0">
                 <a:solidFill>
                   <a:srgbClr val="FFFFFF"/>
                 </a:solidFill>
               </a:rPr>
-              <a:t>- Neil Armstrong</a:t>
+              <a:t>- Team two-beards</a:t>
             </a:r>
           </a:p>
         </p:txBody>

</xml_diff>